<commit_message>
add R and SPSS solution for chi-square test
</commit_message>
<xml_diff>
--- a/Lecture 16_ANOVA/Lecture 16_ANOVA.pptx
+++ b/Lecture 16_ANOVA/Lecture 16_ANOVA.pptx
@@ -5,10 +5,10 @@
     <p:sldMasterId id="2147483648" r:id="rId1"/>
   </p:sldMasterIdLst>
   <p:notesMasterIdLst>
-    <p:notesMasterId r:id="rId38"/>
+    <p:notesMasterId r:id="rId41"/>
   </p:notesMasterIdLst>
   <p:handoutMasterIdLst>
-    <p:handoutMasterId r:id="rId39"/>
+    <p:handoutMasterId r:id="rId42"/>
   </p:handoutMasterIdLst>
   <p:sldIdLst>
     <p:sldId id="257" r:id="rId2"/>
@@ -16,37 +16,40 @@
     <p:sldId id="260" r:id="rId4"/>
     <p:sldId id="259" r:id="rId5"/>
     <p:sldId id="261" r:id="rId6"/>
-    <p:sldId id="262" r:id="rId7"/>
-    <p:sldId id="284" r:id="rId8"/>
-    <p:sldId id="263" r:id="rId9"/>
-    <p:sldId id="265" r:id="rId10"/>
-    <p:sldId id="264" r:id="rId11"/>
-    <p:sldId id="266" r:id="rId12"/>
-    <p:sldId id="267" r:id="rId13"/>
-    <p:sldId id="269" r:id="rId14"/>
-    <p:sldId id="281" r:id="rId15"/>
-    <p:sldId id="268" r:id="rId16"/>
-    <p:sldId id="270" r:id="rId17"/>
-    <p:sldId id="273" r:id="rId18"/>
-    <p:sldId id="271" r:id="rId19"/>
-    <p:sldId id="274" r:id="rId20"/>
-    <p:sldId id="275" r:id="rId21"/>
-    <p:sldId id="276" r:id="rId22"/>
-    <p:sldId id="280" r:id="rId23"/>
-    <p:sldId id="279" r:id="rId24"/>
-    <p:sldId id="282" r:id="rId25"/>
-    <p:sldId id="283" r:id="rId26"/>
-    <p:sldId id="272" r:id="rId27"/>
-    <p:sldId id="285" r:id="rId28"/>
-    <p:sldId id="286" r:id="rId29"/>
-    <p:sldId id="289" r:id="rId30"/>
-    <p:sldId id="291" r:id="rId31"/>
-    <p:sldId id="287" r:id="rId32"/>
-    <p:sldId id="288" r:id="rId33"/>
-    <p:sldId id="292" r:id="rId34"/>
-    <p:sldId id="290" r:id="rId35"/>
-    <p:sldId id="293" r:id="rId36"/>
-    <p:sldId id="294" r:id="rId37"/>
+    <p:sldId id="295" r:id="rId7"/>
+    <p:sldId id="262" r:id="rId8"/>
+    <p:sldId id="284" r:id="rId9"/>
+    <p:sldId id="263" r:id="rId10"/>
+    <p:sldId id="265" r:id="rId11"/>
+    <p:sldId id="264" r:id="rId12"/>
+    <p:sldId id="266" r:id="rId13"/>
+    <p:sldId id="267" r:id="rId14"/>
+    <p:sldId id="269" r:id="rId15"/>
+    <p:sldId id="281" r:id="rId16"/>
+    <p:sldId id="268" r:id="rId17"/>
+    <p:sldId id="270" r:id="rId18"/>
+    <p:sldId id="273" r:id="rId19"/>
+    <p:sldId id="271" r:id="rId20"/>
+    <p:sldId id="296" r:id="rId21"/>
+    <p:sldId id="274" r:id="rId22"/>
+    <p:sldId id="275" r:id="rId23"/>
+    <p:sldId id="276" r:id="rId24"/>
+    <p:sldId id="280" r:id="rId25"/>
+    <p:sldId id="279" r:id="rId26"/>
+    <p:sldId id="282" r:id="rId27"/>
+    <p:sldId id="283" r:id="rId28"/>
+    <p:sldId id="272" r:id="rId29"/>
+    <p:sldId id="285" r:id="rId30"/>
+    <p:sldId id="286" r:id="rId31"/>
+    <p:sldId id="289" r:id="rId32"/>
+    <p:sldId id="291" r:id="rId33"/>
+    <p:sldId id="287" r:id="rId34"/>
+    <p:sldId id="288" r:id="rId35"/>
+    <p:sldId id="292" r:id="rId36"/>
+    <p:sldId id="290" r:id="rId37"/>
+    <p:sldId id="293" r:id="rId38"/>
+    <p:sldId id="294" r:id="rId39"/>
+    <p:sldId id="297" r:id="rId40"/>
   </p:sldIdLst>
   <p:sldSz cx="9144000" cy="6858000" type="screen4x3"/>
   <p:notesSz cx="7010400" cy="9296400"/>
@@ -147,7 +150,7 @@
   </p:defaultTextStyle>
   <p:extLst>
     <p:ext uri="{EFAFB233-063F-42B5-8137-9DF3F51BA10A}">
-      <p15:sldGuideLst xmlns="" xmlns:p15="http://schemas.microsoft.com/office/powerpoint/2012/main">
+      <p15:sldGuideLst xmlns:p15="http://schemas.microsoft.com/office/powerpoint/2012/main" xmlns="">
         <p15:guide id="1" orient="horz" pos="2160">
           <p15:clr>
             <a:srgbClr val="A4A3A4"/>
@@ -246,7 +249,7 @@
           <a:p>
             <a:fld id="{BA014BA1-6095-4074-A3B1-2AA768CAF336}" type="datetimeFigureOut">
               <a:rPr lang="en-US" smtClean="0"/>
-              <a:t>4/12/18</a:t>
+              <a:t>4/17/18</a:t>
             </a:fld>
             <a:endParaRPr lang="en-US"/>
           </a:p>
@@ -411,7 +414,7 @@
           <a:p>
             <a:fld id="{4A8F6F57-B951-4583-958B-812492E27BF3}" type="datetimeFigureOut">
               <a:rPr lang="en-US" smtClean="0"/>
-              <a:t>4/12/18</a:t>
+              <a:t>4/17/18</a:t>
             </a:fld>
             <a:endParaRPr lang="en-US"/>
           </a:p>
@@ -828,7 +831,7 @@
           <a:p>
             <a:fld id="{743E757E-8A4B-4E9F-8BC6-B75D09CC4A79}" type="slidenum">
               <a:rPr lang="en-US" smtClean="0"/>
-              <a:t>15</a:t>
+              <a:t>16</a:t>
             </a:fld>
             <a:endParaRPr lang="en-US"/>
           </a:p>
@@ -915,7 +918,7 @@
           <a:p>
             <a:fld id="{743E757E-8A4B-4E9F-8BC6-B75D09CC4A79}" type="slidenum">
               <a:rPr lang="en-US" smtClean="0"/>
-              <a:t>16</a:t>
+              <a:t>17</a:t>
             </a:fld>
             <a:endParaRPr lang="en-US"/>
           </a:p>
@@ -1007,7 +1010,7 @@
           <a:p>
             <a:fld id="{8E6DD522-2367-41BA-B6EB-6260F7A58F5F}" type="slidenum">
               <a:rPr lang="en-US" smtClean="0"/>
-              <a:t>17</a:t>
+              <a:t>18</a:t>
             </a:fld>
             <a:endParaRPr lang="en-US"/>
           </a:p>
@@ -1094,7 +1097,7 @@
             <a:fld id="{259D6929-1D84-4AC5-8E58-AEAC9F451A26}" type="slidenum">
               <a:rPr lang="en-US" smtClean="0"/>
               <a:pPr/>
-              <a:t>19</a:t>
+              <a:t>21</a:t>
             </a:fld>
             <a:endParaRPr lang="en-US"/>
           </a:p>
@@ -1176,7 +1179,7 @@
             <a:fld id="{259D6929-1D84-4AC5-8E58-AEAC9F451A26}" type="slidenum">
               <a:rPr lang="en-US" smtClean="0"/>
               <a:pPr/>
-              <a:t>20</a:t>
+              <a:t>22</a:t>
             </a:fld>
             <a:endParaRPr lang="en-US"/>
           </a:p>
@@ -1263,7 +1266,7 @@
             <a:fld id="{259D6929-1D84-4AC5-8E58-AEAC9F451A26}" type="slidenum">
               <a:rPr lang="en-US" smtClean="0"/>
               <a:pPr/>
-              <a:t>21</a:t>
+              <a:t>23</a:t>
             </a:fld>
             <a:endParaRPr lang="en-US" dirty="0"/>
           </a:p>
@@ -1350,7 +1353,7 @@
             <a:fld id="{259D6929-1D84-4AC5-8E58-AEAC9F451A26}" type="slidenum">
               <a:rPr lang="en-US" smtClean="0"/>
               <a:pPr/>
-              <a:t>23</a:t>
+              <a:t>25</a:t>
             </a:fld>
             <a:endParaRPr lang="en-US" dirty="0"/>
           </a:p>
@@ -1468,7 +1471,7 @@
           <a:p>
             <a:fld id="{743E757E-8A4B-4E9F-8BC6-B75D09CC4A79}" type="slidenum">
               <a:rPr lang="en-US" smtClean="0"/>
-              <a:t>27</a:t>
+              <a:t>29</a:t>
             </a:fld>
             <a:endParaRPr lang="en-US"/>
           </a:p>
@@ -1666,7 +1669,7 @@
           <a:p>
             <a:fld id="{8B5D1A32-7818-4EE9-B006-3DEC4023BBB6}" type="datetime1">
               <a:rPr lang="en-US" smtClean="0"/>
-              <a:t>4/12/18</a:t>
+              <a:t>4/17/18</a:t>
             </a:fld>
             <a:endParaRPr lang="en-US"/>
           </a:p>
@@ -1834,7 +1837,7 @@
           <a:p>
             <a:fld id="{2D585832-CEAF-4883-91D5-A210D79374E7}" type="datetime1">
               <a:rPr lang="en-US" smtClean="0"/>
-              <a:t>4/12/18</a:t>
+              <a:t>4/17/18</a:t>
             </a:fld>
             <a:endParaRPr lang="en-US"/>
           </a:p>
@@ -2012,7 +2015,7 @@
           <a:p>
             <a:fld id="{A059ED9E-7502-444E-A07C-F85E57D80C10}" type="datetime1">
               <a:rPr lang="en-US" smtClean="0"/>
-              <a:t>4/12/18</a:t>
+              <a:t>4/17/18</a:t>
             </a:fld>
             <a:endParaRPr lang="en-US"/>
           </a:p>
@@ -2180,7 +2183,7 @@
           <a:p>
             <a:fld id="{E35C81AA-9889-4FC5-BC36-A42ABA55DCF9}" type="datetime1">
               <a:rPr lang="en-US" smtClean="0"/>
-              <a:t>4/12/18</a:t>
+              <a:t>4/17/18</a:t>
             </a:fld>
             <a:endParaRPr lang="en-US"/>
           </a:p>
@@ -2425,7 +2428,7 @@
           <a:p>
             <a:fld id="{3117989F-2C1D-4B74-B740-A2877FBE5350}" type="datetime1">
               <a:rPr lang="en-US" smtClean="0"/>
-              <a:t>4/12/18</a:t>
+              <a:t>4/17/18</a:t>
             </a:fld>
             <a:endParaRPr lang="en-US"/>
           </a:p>
@@ -2710,7 +2713,7 @@
           <a:p>
             <a:fld id="{81E3CDB6-39C7-470E-A406-1E9C450DFABD}" type="datetime1">
               <a:rPr lang="en-US" smtClean="0"/>
-              <a:t>4/12/18</a:t>
+              <a:t>4/17/18</a:t>
             </a:fld>
             <a:endParaRPr lang="en-US"/>
           </a:p>
@@ -3129,7 +3132,7 @@
           <a:p>
             <a:fld id="{25767A16-BAAB-49B8-AF91-74FDAEAA89DA}" type="datetime1">
               <a:rPr lang="en-US" smtClean="0"/>
-              <a:t>4/12/18</a:t>
+              <a:t>4/17/18</a:t>
             </a:fld>
             <a:endParaRPr lang="en-US"/>
           </a:p>
@@ -3246,7 +3249,7 @@
           <a:p>
             <a:fld id="{1EC9360C-6CBB-4643-896A-1F64E8A73E84}" type="datetime1">
               <a:rPr lang="en-US" smtClean="0"/>
-              <a:t>4/12/18</a:t>
+              <a:t>4/17/18</a:t>
             </a:fld>
             <a:endParaRPr lang="en-US"/>
           </a:p>
@@ -3341,7 +3344,7 @@
           <a:p>
             <a:fld id="{BDEB245D-813F-41DD-803E-8683C658AF62}" type="datetime1">
               <a:rPr lang="en-US" smtClean="0"/>
-              <a:t>4/12/18</a:t>
+              <a:t>4/17/18</a:t>
             </a:fld>
             <a:endParaRPr lang="en-US"/>
           </a:p>
@@ -3616,7 +3619,7 @@
           <a:p>
             <a:fld id="{F9772D9C-5EB0-459D-828A-307928009EF0}" type="datetime1">
               <a:rPr lang="en-US" smtClean="0"/>
-              <a:t>4/12/18</a:t>
+              <a:t>4/17/18</a:t>
             </a:fld>
             <a:endParaRPr lang="en-US"/>
           </a:p>
@@ -3868,7 +3871,7 @@
           <a:p>
             <a:fld id="{A6459510-F79E-4A42-AB4A-9B8E0060CEF0}" type="datetime1">
               <a:rPr lang="en-US" smtClean="0"/>
-              <a:t>4/12/18</a:t>
+              <a:t>4/17/18</a:t>
             </a:fld>
             <a:endParaRPr lang="en-US"/>
           </a:p>
@@ -4079,7 +4082,7 @@
           <a:p>
             <a:fld id="{775AFB68-8B74-4942-A8F2-680518803AE5}" type="datetime1">
               <a:rPr lang="en-US" smtClean="0"/>
-              <a:t>4/12/18</a:t>
+              <a:t>4/17/18</a:t>
             </a:fld>
             <a:endParaRPr lang="en-US"/>
           </a:p>
@@ -4739,6 +4742,156 @@
           <a:lstStyle/>
           <a:p>
             <a:r>
+              <a:rPr lang="en-US" sz="4800" b="1" dirty="0">
+                <a:solidFill>
+                  <a:srgbClr val="000099"/>
+                </a:solidFill>
+                <a:latin typeface="Palatino Linotype" pitchFamily="18" charset="0"/>
+              </a:rPr>
+              <a:t>Example</a:t>
+            </a:r>
+          </a:p>
+        </p:txBody>
+      </p:sp>
+      <p:sp>
+        <p:nvSpPr>
+          <p:cNvPr id="3" name="Content Placeholder 2"/>
+          <p:cNvSpPr>
+            <a:spLocks noGrp="1"/>
+          </p:cNvSpPr>
+          <p:nvPr>
+            <p:ph idx="1"/>
+          </p:nvPr>
+        </p:nvSpPr>
+        <p:spPr/>
+        <p:txBody>
+          <a:bodyPr>
+            <a:normAutofit fontScale="77500" lnSpcReduction="20000"/>
+          </a:bodyPr>
+          <a:lstStyle/>
+          <a:p>
+            <a:r>
+              <a:rPr lang="en-US" dirty="0">
+                <a:latin typeface="Palatino Linotype" pitchFamily="18" charset="0"/>
+              </a:rPr>
+              <a:t>Suppose we are interested in treatment that purport to reduce agoraphobia (fear of unfamiliar environments) symptoms. Treatments are expensive and we also have little money for screening, so we are only able to find 12 sufferers and randomly assign them to 3 conditions:</a:t>
+            </a:r>
+          </a:p>
+          <a:p>
+            <a:pPr lvl="1"/>
+            <a:r>
+              <a:rPr lang="en-US" dirty="0">
+                <a:latin typeface="Palatino Linotype" pitchFamily="18" charset="0"/>
+              </a:rPr>
+              <a:t>Rational-Emotive (REBT)</a:t>
+            </a:r>
+          </a:p>
+          <a:p>
+            <a:pPr lvl="1"/>
+            <a:r>
+              <a:rPr lang="en-US" dirty="0">
+                <a:latin typeface="Palatino Linotype" pitchFamily="18" charset="0"/>
+              </a:rPr>
+              <a:t>Psychoanalytic (PA)</a:t>
+            </a:r>
+          </a:p>
+          <a:p>
+            <a:pPr lvl="1"/>
+            <a:r>
+              <a:rPr lang="en-US" dirty="0">
+                <a:latin typeface="Palatino Linotype" pitchFamily="18" charset="0"/>
+              </a:rPr>
+              <a:t>Behavioral (B)</a:t>
+            </a:r>
+          </a:p>
+          <a:p>
+            <a:pPr marL="457200" lvl="1" indent="0">
+              <a:buNone/>
+            </a:pPr>
+            <a:r>
+              <a:rPr lang="en-US" dirty="0">
+                <a:latin typeface="Palatino Linotype" pitchFamily="18" charset="0"/>
+              </a:rPr>
+              <a:t>After 12 weeks of therapy, we administer the Panic scale (higher values mean more anxiety), and we determine the total score on a random subset of questions. How can we determine whether there is difference among the treatment?</a:t>
+            </a:r>
+          </a:p>
+        </p:txBody>
+      </p:sp>
+      <p:sp>
+        <p:nvSpPr>
+          <p:cNvPr id="4" name="Slide Number Placeholder 3"/>
+          <p:cNvSpPr>
+            <a:spLocks noGrp="1"/>
+          </p:cNvSpPr>
+          <p:nvPr>
+            <p:ph type="sldNum" sz="quarter" idx="12"/>
+          </p:nvPr>
+        </p:nvSpPr>
+        <p:spPr/>
+        <p:txBody>
+          <a:bodyPr/>
+          <a:lstStyle/>
+          <a:p>
+            <a:fld id="{9BF08E50-6CC6-4A91-911D-ECC366F28EE7}" type="slidenum">
+              <a:rPr lang="en-US" smtClean="0">
+                <a:latin typeface="Palatino Linotype" pitchFamily="18" charset="0"/>
+              </a:rPr>
+              <a:t>10</a:t>
+            </a:fld>
+            <a:endParaRPr lang="en-US">
+              <a:latin typeface="Palatino Linotype" pitchFamily="18" charset="0"/>
+            </a:endParaRPr>
+          </a:p>
+        </p:txBody>
+      </p:sp>
+    </p:spTree>
+    <p:extLst>
+      <p:ext uri="{BB962C8B-B14F-4D97-AF65-F5344CB8AC3E}">
+        <p14:creationId xmlns:p14="http://schemas.microsoft.com/office/powerpoint/2010/main" val="2197502359"/>
+      </p:ext>
+    </p:extLst>
+  </p:cSld>
+  <p:clrMapOvr>
+    <a:masterClrMapping/>
+  </p:clrMapOvr>
+</p:sld>
+</file>
+
+<file path=ppt/slides/slide11.xml><?xml version="1.0" encoding="utf-8"?>
+<p:sld xmlns:a="http://schemas.openxmlformats.org/drawingml/2006/main" xmlns:r="http://schemas.openxmlformats.org/officeDocument/2006/relationships" xmlns:p="http://schemas.openxmlformats.org/presentationml/2006/main">
+  <p:cSld>
+    <p:spTree>
+      <p:nvGrpSpPr>
+        <p:cNvPr id="1" name=""/>
+        <p:cNvGrpSpPr/>
+        <p:nvPr/>
+      </p:nvGrpSpPr>
+      <p:grpSpPr>
+        <a:xfrm>
+          <a:off x="0" y="0"/>
+          <a:ext cx="0" cy="0"/>
+          <a:chOff x="0" y="0"/>
+          <a:chExt cx="0" cy="0"/>
+        </a:xfrm>
+      </p:grpSpPr>
+      <p:sp>
+        <p:nvSpPr>
+          <p:cNvPr id="2" name="Title 1"/>
+          <p:cNvSpPr>
+            <a:spLocks noGrp="1"/>
+          </p:cNvSpPr>
+          <p:nvPr>
+            <p:ph type="title"/>
+          </p:nvPr>
+        </p:nvSpPr>
+        <p:spPr/>
+        <p:txBody>
+          <a:bodyPr>
+            <a:normAutofit/>
+          </a:bodyPr>
+          <a:lstStyle/>
+          <a:p>
+            <a:r>
               <a:rPr lang="en-US" b="1" dirty="0">
                 <a:solidFill>
                   <a:srgbClr val="000099"/>
@@ -4850,7 +5003,7 @@
           <a:p>
             <a:fld id="{71E0F468-36C2-4A31-ABC4-3235B7B5704F}" type="slidenum">
               <a:rPr lang="en-US" smtClean="0"/>
-              <a:t>10</a:t>
+              <a:t>11</a:t>
             </a:fld>
             <a:endParaRPr lang="en-US"/>
           </a:p>
@@ -4860,341 +5013,6 @@
     <p:extLst>
       <p:ext uri="{BB962C8B-B14F-4D97-AF65-F5344CB8AC3E}">
         <p14:creationId xmlns:p14="http://schemas.microsoft.com/office/powerpoint/2010/main" val="900095805"/>
-      </p:ext>
-    </p:extLst>
-  </p:cSld>
-  <p:clrMapOvr>
-    <a:masterClrMapping/>
-  </p:clrMapOvr>
-</p:sld>
-</file>
-
-<file path=ppt/slides/slide11.xml><?xml version="1.0" encoding="utf-8"?>
-<p:sld xmlns:a="http://schemas.openxmlformats.org/drawingml/2006/main" xmlns:r="http://schemas.openxmlformats.org/officeDocument/2006/relationships" xmlns:p="http://schemas.openxmlformats.org/presentationml/2006/main">
-  <p:cSld>
-    <p:spTree>
-      <p:nvGrpSpPr>
-        <p:cNvPr id="1" name=""/>
-        <p:cNvGrpSpPr/>
-        <p:nvPr/>
-      </p:nvGrpSpPr>
-      <p:grpSpPr>
-        <a:xfrm>
-          <a:off x="0" y="0"/>
-          <a:ext cx="0" cy="0"/>
-          <a:chOff x="0" y="0"/>
-          <a:chExt cx="0" cy="0"/>
-        </a:xfrm>
-      </p:grpSpPr>
-      <p:sp>
-        <p:nvSpPr>
-          <p:cNvPr id="2" name="Title 1"/>
-          <p:cNvSpPr>
-            <a:spLocks noGrp="1"/>
-          </p:cNvSpPr>
-          <p:nvPr>
-            <p:ph type="title"/>
-          </p:nvPr>
-        </p:nvSpPr>
-        <p:spPr/>
-        <p:txBody>
-          <a:bodyPr>
-            <a:noAutofit/>
-          </a:bodyPr>
-          <a:lstStyle/>
-          <a:p>
-            <a:r>
-              <a:rPr lang="en-US" b="1" dirty="0">
-                <a:solidFill>
-                  <a:srgbClr val="000099"/>
-                </a:solidFill>
-                <a:latin typeface="Palatino Linotype" pitchFamily="18" charset="0"/>
-              </a:rPr>
-              <a:t>ANOVA</a:t>
-            </a:r>
-          </a:p>
-        </p:txBody>
-      </p:sp>
-      <mc:AlternateContent xmlns:mc="http://schemas.openxmlformats.org/markup-compatibility/2006" xmlns:a14="http://schemas.microsoft.com/office/drawing/2010/main">
-        <mc:Choice Requires="a14">
-          <p:sp>
-            <p:nvSpPr>
-              <p:cNvPr id="3" name="Content Placeholder 2"/>
-              <p:cNvSpPr>
-                <a:spLocks noGrp="1"/>
-              </p:cNvSpPr>
-              <p:nvPr>
-                <p:ph idx="1"/>
-              </p:nvPr>
-            </p:nvSpPr>
-            <p:spPr/>
-            <p:txBody>
-              <a:bodyPr>
-                <a:normAutofit/>
-              </a:bodyPr>
-              <a:lstStyle/>
-              <a:p>
-                <a:pPr marL="342900" lvl="2" indent="-342900"/>
-                <a:r>
-                  <a:rPr lang="en-US" sz="2800" dirty="0">
-                    <a:latin typeface="Palatino Linotype" pitchFamily="18" charset="0"/>
-                    <a:ea typeface="Cambria Math" pitchFamily="18" charset="0"/>
-                    <a:cs typeface="Times New Roman" pitchFamily="18" charset="0"/>
-                  </a:rPr>
-                  <a:t>Null hypothesis  (omnibus test)</a:t>
-                </a:r>
-              </a:p>
-              <a:p>
-                <a:pPr marL="800100" lvl="3" indent="-342900">
-                  <a:buFont typeface="Arial" pitchFamily="34" charset="0"/>
-                  <a:buChar char="•"/>
-                </a:pPr>
-                <a:r>
-                  <a:rPr lang="el-GR" sz="2800" dirty="0">
-                    <a:latin typeface="Palatino Linotype" pitchFamily="18" charset="0"/>
-                    <a:ea typeface="Cambria Math" pitchFamily="18" charset="0"/>
-                    <a:cs typeface="Times New Roman" pitchFamily="18" charset="0"/>
-                  </a:rPr>
-                  <a:t>μ</a:t>
-                </a:r>
-                <a:r>
-                  <a:rPr lang="en-US" sz="2800" baseline="-25000" dirty="0">
-                    <a:latin typeface="Palatino Linotype" pitchFamily="18" charset="0"/>
-                    <a:ea typeface="Cambria Math" pitchFamily="18" charset="0"/>
-                    <a:cs typeface="Times New Roman" pitchFamily="18" charset="0"/>
-                  </a:rPr>
-                  <a:t>1</a:t>
-                </a:r>
-                <a:r>
-                  <a:rPr lang="en-US" sz="2800" dirty="0">
-                    <a:latin typeface="Palatino Linotype" pitchFamily="18" charset="0"/>
-                    <a:ea typeface="Cambria Math" pitchFamily="18" charset="0"/>
-                    <a:cs typeface="Times New Roman" pitchFamily="18" charset="0"/>
-                  </a:rPr>
-                  <a:t> = </a:t>
-                </a:r>
-                <a:r>
-                  <a:rPr lang="el-GR" sz="2800" dirty="0">
-                    <a:latin typeface="Palatino Linotype" pitchFamily="18" charset="0"/>
-                    <a:ea typeface="Cambria Math" pitchFamily="18" charset="0"/>
-                    <a:cs typeface="Times New Roman" pitchFamily="18" charset="0"/>
-                  </a:rPr>
-                  <a:t>μ</a:t>
-                </a:r>
-                <a:r>
-                  <a:rPr lang="en-US" sz="2800" baseline="-25000" dirty="0">
-                    <a:latin typeface="Palatino Linotype" pitchFamily="18" charset="0"/>
-                    <a:ea typeface="Cambria Math" pitchFamily="18" charset="0"/>
-                    <a:cs typeface="Times New Roman" pitchFamily="18" charset="0"/>
-                  </a:rPr>
-                  <a:t>2</a:t>
-                </a:r>
-                <a:r>
-                  <a:rPr lang="en-US" sz="2800" dirty="0">
-                    <a:latin typeface="Palatino Linotype" pitchFamily="18" charset="0"/>
-                    <a:ea typeface="Cambria Math" pitchFamily="18" charset="0"/>
-                    <a:cs typeface="Times New Roman" pitchFamily="18" charset="0"/>
-                  </a:rPr>
-                  <a:t> = </a:t>
-                </a:r>
-                <a:r>
-                  <a:rPr lang="el-GR" sz="2800" dirty="0">
-                    <a:latin typeface="Palatino Linotype" pitchFamily="18" charset="0"/>
-                    <a:ea typeface="Cambria Math" pitchFamily="18" charset="0"/>
-                    <a:cs typeface="Times New Roman" pitchFamily="18" charset="0"/>
-                  </a:rPr>
-                  <a:t>μ</a:t>
-                </a:r>
-                <a:r>
-                  <a:rPr lang="en-US" sz="2800" baseline="-25000" dirty="0">
-                    <a:latin typeface="Palatino Linotype" pitchFamily="18" charset="0"/>
-                    <a:ea typeface="Cambria Math" pitchFamily="18" charset="0"/>
-                    <a:cs typeface="Times New Roman" pitchFamily="18" charset="0"/>
-                  </a:rPr>
-                  <a:t>3</a:t>
-                </a:r>
-                <a:r>
-                  <a:rPr lang="en-US" sz="2800" dirty="0">
-                    <a:latin typeface="Palatino Linotype" pitchFamily="18" charset="0"/>
-                    <a:ea typeface="Cambria Math" pitchFamily="18" charset="0"/>
-                    <a:cs typeface="Times New Roman" pitchFamily="18" charset="0"/>
-                  </a:rPr>
-                  <a:t> = ….= </a:t>
-                </a:r>
-                <a:r>
-                  <a:rPr lang="el-GR" sz="2800" dirty="0">
-                    <a:latin typeface="Palatino Linotype" pitchFamily="18" charset="0"/>
-                    <a:ea typeface="Cambria Math" pitchFamily="18" charset="0"/>
-                    <a:cs typeface="Times New Roman" pitchFamily="18" charset="0"/>
-                  </a:rPr>
-                  <a:t>μ</a:t>
-                </a:r>
-                <a:r>
-                  <a:rPr lang="en-US" sz="2800" baseline="-25000" dirty="0">
-                    <a:latin typeface="Palatino Linotype" pitchFamily="18" charset="0"/>
-                    <a:ea typeface="Cambria Math" pitchFamily="18" charset="0"/>
-                    <a:cs typeface="Times New Roman" pitchFamily="18" charset="0"/>
-                  </a:rPr>
-                  <a:t>k</a:t>
-                </a:r>
-                <a:endParaRPr lang="en-US" sz="2800" b="1" baseline="-25000" dirty="0">
-                  <a:solidFill>
-                    <a:srgbClr val="0070C0"/>
-                  </a:solidFill>
-                  <a:latin typeface="Palatino Linotype" pitchFamily="18" charset="0"/>
-                  <a:ea typeface="Cambria Math" pitchFamily="18" charset="0"/>
-                  <a:cs typeface="Times New Roman" pitchFamily="18" charset="0"/>
-                </a:endParaRPr>
-              </a:p>
-              <a:p>
-                <a:pPr marL="342900" lvl="2" indent="-342900"/>
-                <a:r>
-                  <a:rPr lang="en-US" sz="2800" dirty="0">
-                    <a:latin typeface="Palatino Linotype" pitchFamily="18" charset="0"/>
-                    <a:ea typeface="Cambria Math" pitchFamily="18" charset="0"/>
-                    <a:cs typeface="Times New Roman" pitchFamily="18" charset="0"/>
-                  </a:rPr>
-                  <a:t>Alternative hypothesis</a:t>
-                </a:r>
-              </a:p>
-              <a:p>
-                <a:pPr marL="800100" lvl="3" indent="-342900">
-                  <a:buFont typeface="Arial" pitchFamily="34" charset="0"/>
-                  <a:buChar char="•"/>
-                </a:pPr>
-                <a:r>
-                  <a:rPr lang="en-US" sz="2800" dirty="0">
-                    <a:latin typeface="Palatino Linotype" pitchFamily="18" charset="0"/>
-                    <a:ea typeface="Cambria Math" pitchFamily="18" charset="0"/>
-                    <a:cs typeface="Times New Roman" pitchFamily="18" charset="0"/>
-                  </a:rPr>
-                  <a:t>At least one </a:t>
-                </a:r>
-                <a:r>
-                  <a:rPr lang="el-GR" sz="2800" dirty="0">
-                    <a:latin typeface="Palatino Linotype" pitchFamily="18" charset="0"/>
-                    <a:ea typeface="Cambria Math" pitchFamily="18" charset="0"/>
-                    <a:cs typeface="Times New Roman" pitchFamily="18" charset="0"/>
-                  </a:rPr>
-                  <a:t>μ</a:t>
-                </a:r>
-                <a:r>
-                  <a:rPr lang="en-US" sz="2800" dirty="0">
-                    <a:latin typeface="Palatino Linotype" pitchFamily="18" charset="0"/>
-                    <a:ea typeface="Cambria Math" pitchFamily="18" charset="0"/>
-                    <a:cs typeface="Times New Roman" pitchFamily="18" charset="0"/>
-                  </a:rPr>
-                  <a:t> is different</a:t>
-                </a:r>
-              </a:p>
-              <a:p>
-                <a:r>
-                  <a:rPr lang="en-US" sz="2800" dirty="0">
-                    <a:latin typeface="Palatino Linotype" pitchFamily="18" charset="0"/>
-                  </a:rPr>
-                  <a:t>Test statistic</a:t>
-                </a:r>
-              </a:p>
-              <a:p>
-                <a:pPr lvl="1"/>
-                <a:r>
-                  <a:rPr lang="en-US" sz="2400" dirty="0">
-                    <a:latin typeface="Palatino Linotype" pitchFamily="18" charset="0"/>
-                  </a:rPr>
-                  <a:t>F-ratio=</a:t>
-                </a:r>
-              </a:p>
-              <a:p>
-                <a:pPr lvl="1"/>
-                <a:r>
-                  <a:rPr lang="en-US" sz="2400" dirty="0">
-                    <a:latin typeface="Palatino Linotype" pitchFamily="18" charset="0"/>
-                  </a:rPr>
-                  <a:t>Procedures</a:t>
-                </a:r>
-              </a:p>
-              <a:p>
-                <a:pPr lvl="2"/>
-                <a:r>
-                  <a:rPr lang="en-US" sz="2000" dirty="0">
-                    <a:latin typeface="Palatino Linotype" pitchFamily="18" charset="0"/>
-                  </a:rPr>
-                  <a:t>Calculate “sum of squares”</a:t>
-                </a:r>
-              </a:p>
-              <a:p>
-                <a:pPr lvl="2"/>
-                <a:r>
-                  <a:rPr lang="en-US" sz="2000" dirty="0">
-                    <a:latin typeface="Palatino Linotype" pitchFamily="18" charset="0"/>
-                  </a:rPr>
-                  <a:t>Convert sum of squares to estimates of variance</a:t>
-                </a:r>
-              </a:p>
-            </p:txBody>
-          </p:sp>
-        </mc:Choice>
-        <mc:Fallback xmlns="">
-          <p:sp>
-            <p:nvSpPr>
-              <p:cNvPr id="3" name="Content Placeholder 2"/>
-              <p:cNvSpPr>
-                <a:spLocks noGrp="1" noRot="1" noChangeAspect="1" noMove="1" noResize="1" noEditPoints="1" noAdjustHandles="1" noChangeArrowheads="1" noChangeShapeType="1" noTextEdit="1"/>
-              </p:cNvSpPr>
-              <p:nvPr>
-                <p:ph idx="1"/>
-              </p:nvPr>
-            </p:nvSpPr>
-            <p:spPr>
-              <a:blipFill rotWithShape="1">
-                <a:blip r:embed="rId2"/>
-                <a:stretch>
-                  <a:fillRect l="-1259" t="-1482" b="-135"/>
-                </a:stretch>
-              </a:blipFill>
-            </p:spPr>
-            <p:txBody>
-              <a:bodyPr/>
-              <a:lstStyle/>
-              <a:p>
-                <a:r>
-                  <a:rPr lang="en-US">
-                    <a:noFill/>
-                  </a:rPr>
-                  <a:t> </a:t>
-                </a:r>
-              </a:p>
-            </p:txBody>
-          </p:sp>
-        </mc:Fallback>
-      </mc:AlternateContent>
-      <p:sp>
-        <p:nvSpPr>
-          <p:cNvPr id="4" name="Slide Number Placeholder 3"/>
-          <p:cNvSpPr>
-            <a:spLocks noGrp="1"/>
-          </p:cNvSpPr>
-          <p:nvPr>
-            <p:ph type="sldNum" sz="quarter" idx="12"/>
-          </p:nvPr>
-        </p:nvSpPr>
-        <p:spPr/>
-        <p:txBody>
-          <a:bodyPr/>
-          <a:lstStyle/>
-          <a:p>
-            <a:fld id="{71E0F468-36C2-4A31-ABC4-3235B7B5704F}" type="slidenum">
-              <a:rPr lang="en-US" smtClean="0"/>
-              <a:t>11</a:t>
-            </a:fld>
-            <a:endParaRPr lang="en-US"/>
-          </a:p>
-        </p:txBody>
-      </p:sp>
-    </p:spTree>
-    <p:extLst>
-      <p:ext uri="{BB962C8B-B14F-4D97-AF65-F5344CB8AC3E}">
-        <p14:creationId xmlns:p14="http://schemas.microsoft.com/office/powerpoint/2010/main" val="2846339335"/>
       </p:ext>
     </p:extLst>
   </p:cSld>
@@ -5233,6 +5051,337 @@
         </p:nvSpPr>
         <p:spPr/>
         <p:txBody>
+          <a:bodyPr>
+            <a:noAutofit/>
+          </a:bodyPr>
+          <a:lstStyle/>
+          <a:p>
+            <a:r>
+              <a:rPr lang="en-US" b="1" dirty="0">
+                <a:solidFill>
+                  <a:srgbClr val="000099"/>
+                </a:solidFill>
+                <a:latin typeface="Palatino Linotype" pitchFamily="18" charset="0"/>
+              </a:rPr>
+              <a:t>ANOVA</a:t>
+            </a:r>
+          </a:p>
+        </p:txBody>
+      </p:sp>
+      <p:sp>
+        <p:nvSpPr>
+          <p:cNvPr id="3" name="Content Placeholder 2"/>
+          <p:cNvSpPr>
+            <a:spLocks noGrp="1"/>
+          </p:cNvSpPr>
+          <p:nvPr>
+            <p:ph idx="1"/>
+          </p:nvPr>
+        </p:nvSpPr>
+        <p:spPr/>
+        <p:txBody>
+          <a:bodyPr>
+            <a:normAutofit lnSpcReduction="10000"/>
+          </a:bodyPr>
+          <a:lstStyle/>
+          <a:p>
+            <a:pPr marL="342900" lvl="2" indent="-342900"/>
+            <a:r>
+              <a:rPr lang="en-US" sz="2800" dirty="0">
+                <a:latin typeface="Palatino Linotype" pitchFamily="18" charset="0"/>
+                <a:ea typeface="Cambria Math" pitchFamily="18" charset="0"/>
+                <a:cs typeface="Times New Roman" pitchFamily="18" charset="0"/>
+              </a:rPr>
+              <a:t>Null hypothesis  (omnibus test)</a:t>
+            </a:r>
+          </a:p>
+          <a:p>
+            <a:pPr marL="800100" lvl="3" indent="-342900">
+              <a:buFont typeface="Arial" pitchFamily="34" charset="0"/>
+              <a:buChar char="•"/>
+            </a:pPr>
+            <a:r>
+              <a:rPr lang="el-GR" sz="2800" dirty="0">
+                <a:latin typeface="Palatino Linotype" pitchFamily="18" charset="0"/>
+                <a:ea typeface="Cambria Math" pitchFamily="18" charset="0"/>
+                <a:cs typeface="Times New Roman" pitchFamily="18" charset="0"/>
+              </a:rPr>
+              <a:t>μ</a:t>
+            </a:r>
+            <a:r>
+              <a:rPr lang="en-US" sz="2800" baseline="-25000" dirty="0">
+                <a:latin typeface="Palatino Linotype" pitchFamily="18" charset="0"/>
+                <a:ea typeface="Cambria Math" pitchFamily="18" charset="0"/>
+                <a:cs typeface="Times New Roman" pitchFamily="18" charset="0"/>
+              </a:rPr>
+              <a:t>1</a:t>
+            </a:r>
+            <a:r>
+              <a:rPr lang="en-US" sz="2800" dirty="0">
+                <a:latin typeface="Palatino Linotype" pitchFamily="18" charset="0"/>
+                <a:ea typeface="Cambria Math" pitchFamily="18" charset="0"/>
+                <a:cs typeface="Times New Roman" pitchFamily="18" charset="0"/>
+              </a:rPr>
+              <a:t> = </a:t>
+            </a:r>
+            <a:r>
+              <a:rPr lang="el-GR" sz="2800" dirty="0">
+                <a:latin typeface="Palatino Linotype" pitchFamily="18" charset="0"/>
+                <a:ea typeface="Cambria Math" pitchFamily="18" charset="0"/>
+                <a:cs typeface="Times New Roman" pitchFamily="18" charset="0"/>
+              </a:rPr>
+              <a:t>μ</a:t>
+            </a:r>
+            <a:r>
+              <a:rPr lang="en-US" sz="2800" baseline="-25000" dirty="0">
+                <a:latin typeface="Palatino Linotype" pitchFamily="18" charset="0"/>
+                <a:ea typeface="Cambria Math" pitchFamily="18" charset="0"/>
+                <a:cs typeface="Times New Roman" pitchFamily="18" charset="0"/>
+              </a:rPr>
+              <a:t>2</a:t>
+            </a:r>
+            <a:r>
+              <a:rPr lang="en-US" sz="2800" dirty="0">
+                <a:latin typeface="Palatino Linotype" pitchFamily="18" charset="0"/>
+                <a:ea typeface="Cambria Math" pitchFamily="18" charset="0"/>
+                <a:cs typeface="Times New Roman" pitchFamily="18" charset="0"/>
+              </a:rPr>
+              <a:t> = </a:t>
+            </a:r>
+            <a:r>
+              <a:rPr lang="el-GR" sz="2800" dirty="0">
+                <a:latin typeface="Palatino Linotype" pitchFamily="18" charset="0"/>
+                <a:ea typeface="Cambria Math" pitchFamily="18" charset="0"/>
+                <a:cs typeface="Times New Roman" pitchFamily="18" charset="0"/>
+              </a:rPr>
+              <a:t>μ</a:t>
+            </a:r>
+            <a:r>
+              <a:rPr lang="en-US" sz="2800" baseline="-25000" dirty="0">
+                <a:latin typeface="Palatino Linotype" pitchFamily="18" charset="0"/>
+                <a:ea typeface="Cambria Math" pitchFamily="18" charset="0"/>
+                <a:cs typeface="Times New Roman" pitchFamily="18" charset="0"/>
+              </a:rPr>
+              <a:t>3</a:t>
+            </a:r>
+            <a:r>
+              <a:rPr lang="en-US" sz="2800" dirty="0">
+                <a:latin typeface="Palatino Linotype" pitchFamily="18" charset="0"/>
+                <a:ea typeface="Cambria Math" pitchFamily="18" charset="0"/>
+                <a:cs typeface="Times New Roman" pitchFamily="18" charset="0"/>
+              </a:rPr>
+              <a:t> = ….= </a:t>
+            </a:r>
+            <a:r>
+              <a:rPr lang="el-GR" sz="2800" dirty="0">
+                <a:latin typeface="Palatino Linotype" pitchFamily="18" charset="0"/>
+                <a:ea typeface="Cambria Math" pitchFamily="18" charset="0"/>
+                <a:cs typeface="Times New Roman" pitchFamily="18" charset="0"/>
+              </a:rPr>
+              <a:t>μ</a:t>
+            </a:r>
+            <a:r>
+              <a:rPr lang="en-US" sz="2800" baseline="-25000" dirty="0">
+                <a:latin typeface="Palatino Linotype" pitchFamily="18" charset="0"/>
+                <a:ea typeface="Cambria Math" pitchFamily="18" charset="0"/>
+                <a:cs typeface="Times New Roman" pitchFamily="18" charset="0"/>
+              </a:rPr>
+              <a:t>k</a:t>
+            </a:r>
+            <a:endParaRPr lang="en-US" sz="2800" b="1" baseline="-25000" dirty="0">
+              <a:solidFill>
+                <a:srgbClr val="0070C0"/>
+              </a:solidFill>
+              <a:latin typeface="Palatino Linotype" pitchFamily="18" charset="0"/>
+              <a:ea typeface="Cambria Math" pitchFamily="18" charset="0"/>
+              <a:cs typeface="Times New Roman" pitchFamily="18" charset="0"/>
+            </a:endParaRPr>
+          </a:p>
+          <a:p>
+            <a:pPr marL="342900" lvl="2" indent="-342900"/>
+            <a:r>
+              <a:rPr lang="en-US" sz="2800" dirty="0">
+                <a:latin typeface="Palatino Linotype" pitchFamily="18" charset="0"/>
+                <a:ea typeface="Cambria Math" pitchFamily="18" charset="0"/>
+                <a:cs typeface="Times New Roman" pitchFamily="18" charset="0"/>
+              </a:rPr>
+              <a:t>Alternative hypothesis</a:t>
+            </a:r>
+          </a:p>
+          <a:p>
+            <a:pPr marL="800100" lvl="3" indent="-342900">
+              <a:buFont typeface="Arial" pitchFamily="34" charset="0"/>
+              <a:buChar char="•"/>
+            </a:pPr>
+            <a:r>
+              <a:rPr lang="en-US" sz="2800" dirty="0">
+                <a:latin typeface="Palatino Linotype" pitchFamily="18" charset="0"/>
+                <a:ea typeface="Cambria Math" pitchFamily="18" charset="0"/>
+                <a:cs typeface="Times New Roman" pitchFamily="18" charset="0"/>
+              </a:rPr>
+              <a:t>At least one </a:t>
+            </a:r>
+            <a:r>
+              <a:rPr lang="el-GR" sz="2800" dirty="0">
+                <a:latin typeface="Palatino Linotype" pitchFamily="18" charset="0"/>
+                <a:ea typeface="Cambria Math" pitchFamily="18" charset="0"/>
+                <a:cs typeface="Times New Roman" pitchFamily="18" charset="0"/>
+              </a:rPr>
+              <a:t>μ</a:t>
+            </a:r>
+            <a:r>
+              <a:rPr lang="en-US" sz="2800" dirty="0">
+                <a:latin typeface="Palatino Linotype" pitchFamily="18" charset="0"/>
+                <a:ea typeface="Cambria Math" pitchFamily="18" charset="0"/>
+                <a:cs typeface="Times New Roman" pitchFamily="18" charset="0"/>
+              </a:rPr>
+              <a:t> is different</a:t>
+            </a:r>
+          </a:p>
+          <a:p>
+            <a:r>
+              <a:rPr lang="en-US" sz="2800" dirty="0">
+                <a:latin typeface="Palatino Linotype" pitchFamily="18" charset="0"/>
+              </a:rPr>
+              <a:t>Test statistic</a:t>
+            </a:r>
+          </a:p>
+          <a:p>
+            <a:pPr lvl="1"/>
+            <a:endParaRPr lang="en-US" sz="2400" dirty="0" smtClean="0">
+              <a:latin typeface="Palatino Linotype" pitchFamily="18" charset="0"/>
+            </a:endParaRPr>
+          </a:p>
+          <a:p>
+            <a:pPr lvl="1"/>
+            <a:endParaRPr lang="en-US" sz="2400" dirty="0">
+              <a:latin typeface="Palatino Linotype" pitchFamily="18" charset="0"/>
+            </a:endParaRPr>
+          </a:p>
+          <a:p>
+            <a:pPr lvl="1"/>
+            <a:r>
+              <a:rPr lang="en-US" sz="2400" dirty="0">
+                <a:latin typeface="Palatino Linotype" pitchFamily="18" charset="0"/>
+              </a:rPr>
+              <a:t>Procedures</a:t>
+            </a:r>
+          </a:p>
+          <a:p>
+            <a:pPr lvl="2"/>
+            <a:r>
+              <a:rPr lang="en-US" sz="2000" dirty="0">
+                <a:latin typeface="Palatino Linotype" pitchFamily="18" charset="0"/>
+              </a:rPr>
+              <a:t>Calculate “sum of squares”</a:t>
+            </a:r>
+          </a:p>
+          <a:p>
+            <a:pPr lvl="2"/>
+            <a:r>
+              <a:rPr lang="en-US" sz="2000" dirty="0">
+                <a:latin typeface="Palatino Linotype" pitchFamily="18" charset="0"/>
+              </a:rPr>
+              <a:t>Convert sum of squares to estimates of variance</a:t>
+            </a:r>
+          </a:p>
+        </p:txBody>
+      </p:sp>
+      <p:sp>
+        <p:nvSpPr>
+          <p:cNvPr id="4" name="Slide Number Placeholder 3"/>
+          <p:cNvSpPr>
+            <a:spLocks noGrp="1"/>
+          </p:cNvSpPr>
+          <p:nvPr>
+            <p:ph type="sldNum" sz="quarter" idx="12"/>
+          </p:nvPr>
+        </p:nvSpPr>
+        <p:spPr/>
+        <p:txBody>
+          <a:bodyPr/>
+          <a:lstStyle/>
+          <a:p>
+            <a:fld id="{71E0F468-36C2-4A31-ABC4-3235B7B5704F}" type="slidenum">
+              <a:rPr lang="en-US" smtClean="0"/>
+              <a:t>12</a:t>
+            </a:fld>
+            <a:endParaRPr lang="en-US"/>
+          </a:p>
+        </p:txBody>
+      </p:sp>
+      <p:pic>
+        <p:nvPicPr>
+          <p:cNvPr id="5" name="Picture 4" descr="f ratio equation.png"/>
+          <p:cNvPicPr>
+            <a:picLocks noChangeAspect="1"/>
+          </p:cNvPicPr>
+          <p:nvPr/>
+        </p:nvPicPr>
+        <p:blipFill>
+          <a:blip r:embed="rId2">
+            <a:extLst>
+              <a:ext uri="{28A0092B-C50C-407E-A947-70E740481C1C}">
+                <a14:useLocalDpi xmlns:a14="http://schemas.microsoft.com/office/drawing/2010/main" val="0"/>
+              </a:ext>
+            </a:extLst>
+          </a:blip>
+          <a:stretch>
+            <a:fillRect/>
+          </a:stretch>
+        </p:blipFill>
+        <p:spPr>
+          <a:xfrm>
+            <a:off x="1981200" y="3962400"/>
+            <a:ext cx="2146300" cy="825500"/>
+          </a:xfrm>
+          <a:prstGeom prst="rect">
+            <a:avLst/>
+          </a:prstGeom>
+        </p:spPr>
+      </p:pic>
+    </p:spTree>
+    <p:extLst>
+      <p:ext uri="{BB962C8B-B14F-4D97-AF65-F5344CB8AC3E}">
+        <p14:creationId xmlns:p14="http://schemas.microsoft.com/office/powerpoint/2010/main" val="2846339335"/>
+      </p:ext>
+    </p:extLst>
+  </p:cSld>
+  <p:clrMapOvr>
+    <a:masterClrMapping/>
+  </p:clrMapOvr>
+</p:sld>
+</file>
+
+<file path=ppt/slides/slide13.xml><?xml version="1.0" encoding="utf-8"?>
+<p:sld xmlns:a="http://schemas.openxmlformats.org/drawingml/2006/main" xmlns:r="http://schemas.openxmlformats.org/officeDocument/2006/relationships" xmlns:p="http://schemas.openxmlformats.org/presentationml/2006/main">
+  <p:cSld>
+    <p:spTree>
+      <p:nvGrpSpPr>
+        <p:cNvPr id="1" name=""/>
+        <p:cNvGrpSpPr/>
+        <p:nvPr/>
+      </p:nvGrpSpPr>
+      <p:grpSpPr>
+        <a:xfrm>
+          <a:off x="0" y="0"/>
+          <a:ext cx="0" cy="0"/>
+          <a:chOff x="0" y="0"/>
+          <a:chExt cx="0" cy="0"/>
+        </a:xfrm>
+      </p:grpSpPr>
+      <p:sp>
+        <p:nvSpPr>
+          <p:cNvPr id="2" name="Title 1"/>
+          <p:cNvSpPr>
+            <a:spLocks noGrp="1"/>
+          </p:cNvSpPr>
+          <p:nvPr>
+            <p:ph type="title"/>
+          </p:nvPr>
+        </p:nvSpPr>
+        <p:spPr/>
+        <p:txBody>
           <a:bodyPr/>
           <a:lstStyle/>
           <a:p>
@@ -5343,7 +5492,7 @@
           <a:graphicData uri="http://schemas.openxmlformats.org/presentationml/2006/ole">
             <mc:AlternateContent xmlns:mc="http://schemas.openxmlformats.org/markup-compatibility/2006">
               <mc:Choice xmlns:v="urn:schemas-microsoft-com:vml" Requires="v">
-                <p:oleObj spid="_x0000_s2143" name="Equation" r:id="rId3" imgW="1396800" imgH="355320" progId="Equation.DSMT4">
+                <p:oleObj spid="_x0000_s2171" name="Equation" r:id="rId3" imgW="1396800" imgH="355320" progId="Equation.DSMT4">
                   <p:embed/>
                 </p:oleObj>
               </mc:Choice>
@@ -5427,7 +5576,7 @@
           <a:p>
             <a:fld id="{71E0F468-36C2-4A31-ABC4-3235B7B5704F}" type="slidenum">
               <a:rPr lang="en-US" smtClean="0"/>
-              <a:t>12</a:t>
+              <a:t>13</a:t>
             </a:fld>
             <a:endParaRPr lang="en-US"/>
           </a:p>
@@ -5446,7 +5595,7 @@
 </p:sld>
 </file>
 
-<file path=ppt/slides/slide13.xml><?xml version="1.0" encoding="utf-8"?>
+<file path=ppt/slides/slide14.xml><?xml version="1.0" encoding="utf-8"?>
 <p:sld xmlns:a="http://schemas.openxmlformats.org/drawingml/2006/main" xmlns:r="http://schemas.openxmlformats.org/officeDocument/2006/relationships" xmlns:p="http://schemas.openxmlformats.org/presentationml/2006/main">
   <p:cSld>
     <p:spTree>
@@ -5594,7 +5743,7 @@
           <a:graphicData uri="http://schemas.openxmlformats.org/presentationml/2006/ole">
             <mc:AlternateContent xmlns:mc="http://schemas.openxmlformats.org/markup-compatibility/2006">
               <mc:Choice xmlns:v="urn:schemas-microsoft-com:vml" Requires="v">
-                <p:oleObj spid="_x0000_s3166" name="Equation" r:id="rId3" imgW="1295280" imgH="355320" progId="Equation.DSMT4">
+                <p:oleObj spid="_x0000_s3194" name="Equation" r:id="rId3" imgW="1295280" imgH="355320" progId="Equation.DSMT4">
                   <p:embed/>
                 </p:oleObj>
               </mc:Choice>
@@ -5678,7 +5827,7 @@
           <a:p>
             <a:fld id="{71E0F468-36C2-4A31-ABC4-3235B7B5704F}" type="slidenum">
               <a:rPr lang="en-US" smtClean="0"/>
-              <a:t>13</a:t>
+              <a:t>14</a:t>
             </a:fld>
             <a:endParaRPr lang="en-US"/>
           </a:p>
@@ -5697,7 +5846,7 @@
 </p:sld>
 </file>
 
-<file path=ppt/slides/slide14.xml><?xml version="1.0" encoding="utf-8"?>
+<file path=ppt/slides/slide15.xml><?xml version="1.0" encoding="utf-8"?>
 <p:sld xmlns:a="http://schemas.openxmlformats.org/drawingml/2006/main" xmlns:r="http://schemas.openxmlformats.org/officeDocument/2006/relationships" xmlns:p="http://schemas.openxmlformats.org/presentationml/2006/main">
   <p:cSld>
     <p:spTree>
@@ -5871,7 +6020,7 @@
           <a:graphicData uri="http://schemas.openxmlformats.org/presentationml/2006/ole">
             <mc:AlternateContent xmlns:mc="http://schemas.openxmlformats.org/markup-compatibility/2006">
               <mc:Choice xmlns:v="urn:schemas-microsoft-com:vml" Requires="v">
-                <p:oleObj spid="_x0000_s10314" name="Equation" r:id="rId3" imgW="1333440" imgH="355320" progId="Equation.DSMT4">
+                <p:oleObj spid="_x0000_s10342" name="Equation" r:id="rId3" imgW="1333440" imgH="355320" progId="Equation.DSMT4">
                   <p:embed/>
                 </p:oleObj>
               </mc:Choice>
@@ -5949,7 +6098,7 @@
           <a:p>
             <a:fld id="{71E0F468-36C2-4A31-ABC4-3235B7B5704F}" type="slidenum">
               <a:rPr lang="en-US" smtClean="0"/>
-              <a:t>14</a:t>
+              <a:t>15</a:t>
             </a:fld>
             <a:endParaRPr lang="en-US"/>
           </a:p>
@@ -5968,7 +6117,7 @@
 </p:sld>
 </file>
 
-<file path=ppt/slides/slide15.xml><?xml version="1.0" encoding="utf-8"?>
+<file path=ppt/slides/slide16.xml><?xml version="1.0" encoding="utf-8"?>
 <p:sld xmlns:a="http://schemas.openxmlformats.org/drawingml/2006/main" xmlns:r="http://schemas.openxmlformats.org/officeDocument/2006/relationships" xmlns:p="http://schemas.openxmlformats.org/presentationml/2006/main">
   <p:cSld>
     <p:spTree>
@@ -6108,7 +6257,7 @@
                   <a:t>=</a:t>
                 </a:r>
                 <a14:m>
-                  <m:oMath xmlns="" xmlns:m="http://schemas.openxmlformats.org/officeDocument/2006/math">
+                  <m:oMath xmlns:m="http://schemas.openxmlformats.org/officeDocument/2006/math" xmlns="">
                     <m:f>
                       <m:fPr>
                         <m:ctrlPr>
@@ -6397,7 +6546,7 @@
           <a:graphicData uri="http://schemas.openxmlformats.org/presentationml/2006/ole">
             <mc:AlternateContent xmlns:mc="http://schemas.openxmlformats.org/markup-compatibility/2006">
               <mc:Choice xmlns:v="urn:schemas-microsoft-com:vml" Requires="v">
-                <p:oleObj spid="_x0000_s4187" name="Equation" r:id="rId5" imgW="1066680" imgH="609480" progId="Equation.DSMT4">
+                <p:oleObj spid="_x0000_s4215" name="Equation" r:id="rId5" imgW="1066680" imgH="609480" progId="Equation.DSMT4">
                   <p:embed/>
                 </p:oleObj>
               </mc:Choice>
@@ -6449,7 +6598,7 @@
           <a:p>
             <a:fld id="{71E0F468-36C2-4A31-ABC4-3235B7B5704F}" type="slidenum">
               <a:rPr lang="en-US" smtClean="0"/>
-              <a:t>15</a:t>
+              <a:t>16</a:t>
             </a:fld>
             <a:endParaRPr lang="en-US"/>
           </a:p>
@@ -6468,7 +6617,7 @@
 </p:sld>
 </file>
 
-<file path=ppt/slides/slide16.xml><?xml version="1.0" encoding="utf-8"?>
+<file path=ppt/slides/slide17.xml><?xml version="1.0" encoding="utf-8"?>
 <p:sld xmlns:a="http://schemas.openxmlformats.org/drawingml/2006/main" xmlns:r="http://schemas.openxmlformats.org/officeDocument/2006/relationships" xmlns:p="http://schemas.openxmlformats.org/presentationml/2006/main">
   <p:cSld>
     <p:spTree>
@@ -6575,7 +6724,7 @@
                   <a:t>=</a:t>
                 </a:r>
                 <a14:m>
-                  <m:oMath xmlns="" xmlns:m="http://schemas.openxmlformats.org/officeDocument/2006/math">
+                  <m:oMath xmlns:m="http://schemas.openxmlformats.org/officeDocument/2006/math" xmlns="">
                     <m:f>
                       <m:fPr>
                         <m:ctrlPr>
@@ -6890,7 +7039,7 @@
           <a:graphicData uri="http://schemas.openxmlformats.org/presentationml/2006/ole">
             <mc:AlternateContent xmlns:mc="http://schemas.openxmlformats.org/markup-compatibility/2006">
               <mc:Choice xmlns:v="urn:schemas-microsoft-com:vml" Requires="v">
-                <p:oleObj spid="_x0000_s5208" name="Equation" r:id="rId5" imgW="380880" imgH="431640" progId="Equation.DSMT4">
+                <p:oleObj spid="_x0000_s5236" name="Equation" r:id="rId5" imgW="380880" imgH="431640" progId="Equation.DSMT4">
                   <p:embed/>
                 </p:oleObj>
               </mc:Choice>
@@ -6942,7 +7091,7 @@
           <a:p>
             <a:fld id="{71E0F468-36C2-4A31-ABC4-3235B7B5704F}" type="slidenum">
               <a:rPr lang="en-US" smtClean="0"/>
-              <a:t>16</a:t>
+              <a:t>17</a:t>
             </a:fld>
             <a:endParaRPr lang="en-US"/>
           </a:p>
@@ -6961,7 +7110,7 @@
 </p:sld>
 </file>
 
-<file path=ppt/slides/slide17.xml><?xml version="1.0" encoding="utf-8"?>
+<file path=ppt/slides/slide18.xml><?xml version="1.0" encoding="utf-8"?>
 <p:sld xmlns:a="http://schemas.openxmlformats.org/drawingml/2006/main" xmlns:r="http://schemas.openxmlformats.org/officeDocument/2006/relationships" xmlns:p="http://schemas.openxmlformats.org/presentationml/2006/main">
   <p:cSld>
     <p:spTree>
@@ -7016,129 +7165,110 @@
           </a:p>
         </p:txBody>
       </p:sp>
-      <mc:AlternateContent xmlns:mc="http://schemas.openxmlformats.org/markup-compatibility/2006" xmlns:a14="http://schemas.microsoft.com/office/drawing/2010/main">
-        <mc:Choice Requires="a14">
-          <p:sp>
-            <p:nvSpPr>
-              <p:cNvPr id="3" name="Content Placeholder 2"/>
-              <p:cNvSpPr>
-                <a:spLocks noGrp="1"/>
-              </p:cNvSpPr>
-              <p:nvPr>
-                <p:ph idx="1"/>
-              </p:nvPr>
-            </p:nvSpPr>
-            <p:spPr>
-              <a:xfrm>
-                <a:off x="4876800" y="1600200"/>
-                <a:ext cx="4343400" cy="4724400"/>
-              </a:xfrm>
-            </p:spPr>
-            <p:txBody>
-              <a:bodyPr>
-                <a:normAutofit/>
-              </a:bodyPr>
-              <a:lstStyle/>
-              <a:p>
-                <a:r>
-                  <a:rPr lang="en-US" sz="2400" dirty="0">
-                    <a:latin typeface="Palatino Linotype" pitchFamily="18" charset="0"/>
-                  </a:rPr>
-                  <a:t>F is named for “Fisher”, who developed the ANOVA.</a:t>
-                </a:r>
-              </a:p>
-              <a:p>
-                <a:r>
-                  <a:rPr lang="en-US" sz="2400" dirty="0">
-                    <a:latin typeface="Palatino Linotype" pitchFamily="18" charset="0"/>
-                  </a:rPr>
-                  <a:t>It has two parameters—numerator </a:t>
-                </a:r>
-                <a:r>
-                  <a:rPr lang="en-US" sz="2400" dirty="0" err="1">
-                    <a:latin typeface="Palatino Linotype" pitchFamily="18" charset="0"/>
-                  </a:rPr>
-                  <a:t>df</a:t>
-                </a:r>
-                <a:r>
-                  <a:rPr lang="en-US" sz="2400" dirty="0">
-                    <a:latin typeface="Palatino Linotype" pitchFamily="18" charset="0"/>
-                  </a:rPr>
-                  <a:t> () and denominator </a:t>
-                </a:r>
-                <a:r>
-                  <a:rPr lang="en-US" sz="2400" dirty="0" err="1">
-                    <a:latin typeface="Palatino Linotype" pitchFamily="18" charset="0"/>
-                  </a:rPr>
-                  <a:t>df</a:t>
-                </a:r>
-                <a:r>
-                  <a:rPr lang="en-US" sz="2400" dirty="0">
-                    <a:latin typeface="Palatino Linotype" pitchFamily="18" charset="0"/>
-                  </a:rPr>
-                  <a:t> ()</a:t>
-                </a:r>
-              </a:p>
-              <a:p>
-                <a:r>
-                  <a:rPr lang="en-US" sz="2400" dirty="0">
-                    <a:latin typeface="Palatino Linotype" pitchFamily="18" charset="0"/>
-                  </a:rPr>
-                  <a:t>F can go from 0 to infinity.</a:t>
-                </a:r>
-              </a:p>
-              <a:p>
-                <a:r>
-                  <a:rPr lang="en-US" sz="2400" dirty="0">
-                    <a:solidFill>
-                      <a:srgbClr val="FF0000"/>
-                    </a:solidFill>
-                    <a:latin typeface="Palatino Linotype" pitchFamily="18" charset="0"/>
-                  </a:rPr>
-                  <a:t>The rejection region is always in the upper tail; but pay attention to the statistical hypothesis of ANOVA</a:t>
-                </a:r>
-              </a:p>
-            </p:txBody>
-          </p:sp>
-        </mc:Choice>
-        <mc:Fallback xmlns="">
-          <p:sp>
-            <p:nvSpPr>
-              <p:cNvPr id="3" name="Content Placeholder 2"/>
-              <p:cNvSpPr>
-                <a:spLocks noGrp="1" noRot="1" noChangeAspect="1" noMove="1" noResize="1" noEditPoints="1" noAdjustHandles="1" noChangeArrowheads="1" noChangeShapeType="1" noTextEdit="1"/>
-              </p:cNvSpPr>
-              <p:nvPr>
-                <p:ph idx="1"/>
-              </p:nvPr>
-            </p:nvSpPr>
-            <p:spPr>
-              <a:xfrm>
-                <a:off x="4876800" y="1600200"/>
-                <a:ext cx="4343400" cy="4724400"/>
-              </a:xfrm>
-              <a:blipFill rotWithShape="1">
-                <a:blip r:embed="rId4"/>
-                <a:stretch>
-                  <a:fillRect l="-1823" t="-1032" r="-2945" b="-2323"/>
-                </a:stretch>
-              </a:blipFill>
-            </p:spPr>
-            <p:txBody>
-              <a:bodyPr/>
-              <a:lstStyle/>
-              <a:p>
-                <a:r>
-                  <a:rPr lang="en-US">
-                    <a:noFill/>
-                  </a:rPr>
-                  <a:t> </a:t>
-                </a:r>
-              </a:p>
-            </p:txBody>
-          </p:sp>
-        </mc:Fallback>
-      </mc:AlternateContent>
+      <p:sp>
+        <p:nvSpPr>
+          <p:cNvPr id="3" name="Content Placeholder 2"/>
+          <p:cNvSpPr>
+            <a:spLocks noGrp="1"/>
+          </p:cNvSpPr>
+          <p:nvPr>
+            <p:ph idx="1"/>
+          </p:nvPr>
+        </p:nvSpPr>
+        <p:spPr>
+          <a:xfrm>
+            <a:off x="4876800" y="1600200"/>
+            <a:ext cx="4343400" cy="4724400"/>
+          </a:xfrm>
+        </p:spPr>
+        <p:txBody>
+          <a:bodyPr>
+            <a:normAutofit/>
+          </a:bodyPr>
+          <a:lstStyle/>
+          <a:p>
+            <a:r>
+              <a:rPr lang="en-US" sz="2400" dirty="0">
+                <a:latin typeface="Palatino Linotype" pitchFamily="18" charset="0"/>
+              </a:rPr>
+              <a:t>F is named for “Fisher”, who developed the ANOVA.</a:t>
+            </a:r>
+          </a:p>
+          <a:p>
+            <a:r>
+              <a:rPr lang="en-US" sz="2400" dirty="0">
+                <a:latin typeface="Palatino Linotype" pitchFamily="18" charset="0"/>
+              </a:rPr>
+              <a:t>It has two parameters—numerator </a:t>
+            </a:r>
+            <a:r>
+              <a:rPr lang="en-US" sz="2400" dirty="0" err="1">
+                <a:latin typeface="Palatino Linotype" pitchFamily="18" charset="0"/>
+              </a:rPr>
+              <a:t>df</a:t>
+            </a:r>
+            <a:r>
+              <a:rPr lang="en-US" sz="2400" dirty="0">
+                <a:latin typeface="Palatino Linotype" pitchFamily="18" charset="0"/>
+              </a:rPr>
+              <a:t> </a:t>
+            </a:r>
+            <a:r>
+              <a:rPr lang="en-US" sz="2400" dirty="0" smtClean="0">
+                <a:latin typeface="Palatino Linotype" pitchFamily="18" charset="0"/>
+              </a:rPr>
+              <a:t>and </a:t>
+            </a:r>
+            <a:r>
+              <a:rPr lang="en-US" sz="2400" dirty="0">
+                <a:latin typeface="Palatino Linotype" pitchFamily="18" charset="0"/>
+              </a:rPr>
+              <a:t>denominator </a:t>
+            </a:r>
+            <a:r>
+              <a:rPr lang="en-US" sz="2400" dirty="0" err="1">
+                <a:latin typeface="Palatino Linotype" pitchFamily="18" charset="0"/>
+              </a:rPr>
+              <a:t>df</a:t>
+            </a:r>
+            <a:r>
+              <a:rPr lang="en-US" sz="2400" dirty="0">
+                <a:latin typeface="Palatino Linotype" pitchFamily="18" charset="0"/>
+              </a:rPr>
+              <a:t> </a:t>
+            </a:r>
+            <a:r>
+              <a:rPr lang="en-US" sz="2400" dirty="0" smtClean="0">
+                <a:latin typeface="Palatino Linotype" pitchFamily="18" charset="0"/>
+              </a:rPr>
+              <a:t>F </a:t>
+            </a:r>
+            <a:r>
+              <a:rPr lang="en-US" sz="2400" dirty="0">
+                <a:latin typeface="Palatino Linotype" pitchFamily="18" charset="0"/>
+              </a:rPr>
+              <a:t>can go from 0 to infinity.</a:t>
+            </a:r>
+          </a:p>
+          <a:p>
+            <a:r>
+              <a:rPr lang="en-US" sz="2400" dirty="0">
+                <a:latin typeface="Palatino Linotype" pitchFamily="18" charset="0"/>
+              </a:rPr>
+              <a:t>The rejection region is always in the upper </a:t>
+            </a:r>
+            <a:r>
+              <a:rPr lang="en-US" sz="2400" dirty="0">
+                <a:latin typeface="Palatino Linotype" pitchFamily="18" charset="0"/>
+              </a:rPr>
+              <a:t>tail</a:t>
+            </a:r>
+            <a:endParaRPr lang="en-US" sz="2400" dirty="0">
+              <a:latin typeface="Palatino Linotype" pitchFamily="18" charset="0"/>
+            </a:endParaRPr>
+          </a:p>
+        </p:txBody>
+      </p:sp>
       <p:graphicFrame>
         <p:nvGraphicFramePr>
           <p:cNvPr id="4" name="Object 3"/>
@@ -7161,12 +7291,12 @@
           <a:graphicData uri="http://schemas.openxmlformats.org/presentationml/2006/ole">
             <mc:AlternateContent xmlns:mc="http://schemas.openxmlformats.org/markup-compatibility/2006">
               <mc:Choice xmlns:v="urn:schemas-microsoft-com:vml" Requires="v">
-                <p:oleObj spid="_x0000_s7251" name="Image" r:id="rId5" imgW="5769876" imgH="6007620" progId="">
+                <p:oleObj spid="_x0000_s7279" name="Image" r:id="rId4" imgW="5769876" imgH="6007620" progId="">
                   <p:embed/>
                 </p:oleObj>
               </mc:Choice>
               <mc:Fallback>
-                <p:oleObj name="Image" r:id="rId5" imgW="5769876" imgH="6007620" progId="">
+                <p:oleObj name="Image" r:id="rId4" imgW="5769876" imgH="6007620" progId="">
                   <p:embed/>
                   <p:pic>
                     <p:nvPicPr>
@@ -7177,7 +7307,7 @@
                       <p:nvPr/>
                     </p:nvPicPr>
                     <p:blipFill>
-                      <a:blip r:embed="rId6">
+                      <a:blip r:embed="rId5">
                         <a:extLst>
                           <a:ext uri="{28A0092B-C50C-407E-A947-70E740481C1C}">
                             <a14:useLocalDpi xmlns:a14="http://schemas.microsoft.com/office/drawing/2010/main" val="0"/>
@@ -7229,7 +7359,7 @@
               <a:rPr lang="en-US" smtClean="0">
                 <a:latin typeface="Palatino Linotype" pitchFamily="18" charset="0"/>
               </a:rPr>
-              <a:t>17</a:t>
+              <a:t>18</a:t>
             </a:fld>
             <a:endParaRPr lang="en-US">
               <a:latin typeface="Palatino Linotype" pitchFamily="18" charset="0"/>
@@ -7250,7 +7380,7 @@
 </p:sld>
 </file>
 
-<file path=ppt/slides/slide18.xml><?xml version="1.0" encoding="utf-8"?>
+<file path=ppt/slides/slide19.xml><?xml version="1.0" encoding="utf-8"?>
 <p:sld xmlns:a="http://schemas.openxmlformats.org/drawingml/2006/main" xmlns:r="http://schemas.openxmlformats.org/officeDocument/2006/relationships" xmlns:p="http://schemas.openxmlformats.org/presentationml/2006/main">
   <p:cSld>
     <p:spTree>
@@ -7325,35 +7455,35 @@
                 <a:gridCol w="1645920">
                   <a:extLst>
                     <a:ext uri="{9D8B030D-6E8A-4147-A177-3AD203B41FA5}">
-                      <a16:colId xmlns="" xmlns:a16="http://schemas.microsoft.com/office/drawing/2014/main" xmlns:a14="http://schemas.microsoft.com/office/drawing/2010/main" xmlns:mc="http://schemas.openxmlformats.org/markup-compatibility/2006" val="20000"/>
+                      <a16:colId xmlns:mc="http://schemas.openxmlformats.org/markup-compatibility/2006" xmlns:a14="http://schemas.microsoft.com/office/drawing/2010/main" xmlns:a16="http://schemas.microsoft.com/office/drawing/2014/main" xmlns="" val="20000"/>
                     </a:ext>
                   </a:extLst>
                 </a:gridCol>
                 <a:gridCol w="1645920">
                   <a:extLst>
                     <a:ext uri="{9D8B030D-6E8A-4147-A177-3AD203B41FA5}">
-                      <a16:colId xmlns="" xmlns:a16="http://schemas.microsoft.com/office/drawing/2014/main" xmlns:a14="http://schemas.microsoft.com/office/drawing/2010/main" xmlns:mc="http://schemas.openxmlformats.org/markup-compatibility/2006" val="20001"/>
+                      <a16:colId xmlns:mc="http://schemas.openxmlformats.org/markup-compatibility/2006" xmlns:a14="http://schemas.microsoft.com/office/drawing/2010/main" xmlns:a16="http://schemas.microsoft.com/office/drawing/2014/main" xmlns="" val="20001"/>
                     </a:ext>
                   </a:extLst>
                 </a:gridCol>
                 <a:gridCol w="1645920">
                   <a:extLst>
                     <a:ext uri="{9D8B030D-6E8A-4147-A177-3AD203B41FA5}">
-                      <a16:colId xmlns="" xmlns:a16="http://schemas.microsoft.com/office/drawing/2014/main" xmlns:a14="http://schemas.microsoft.com/office/drawing/2010/main" xmlns:mc="http://schemas.openxmlformats.org/markup-compatibility/2006" val="20002"/>
+                      <a16:colId xmlns:mc="http://schemas.openxmlformats.org/markup-compatibility/2006" xmlns:a14="http://schemas.microsoft.com/office/drawing/2010/main" xmlns:a16="http://schemas.microsoft.com/office/drawing/2014/main" xmlns="" val="20002"/>
                     </a:ext>
                   </a:extLst>
                 </a:gridCol>
                 <a:gridCol w="1645920">
                   <a:extLst>
                     <a:ext uri="{9D8B030D-6E8A-4147-A177-3AD203B41FA5}">
-                      <a16:colId xmlns="" xmlns:a16="http://schemas.microsoft.com/office/drawing/2014/main" xmlns:a14="http://schemas.microsoft.com/office/drawing/2010/main" xmlns:mc="http://schemas.openxmlformats.org/markup-compatibility/2006" val="20003"/>
+                      <a16:colId xmlns:mc="http://schemas.openxmlformats.org/markup-compatibility/2006" xmlns:a14="http://schemas.microsoft.com/office/drawing/2010/main" xmlns:a16="http://schemas.microsoft.com/office/drawing/2014/main" xmlns="" val="20003"/>
                     </a:ext>
                   </a:extLst>
                 </a:gridCol>
                 <a:gridCol w="1645920">
                   <a:extLst>
                     <a:ext uri="{9D8B030D-6E8A-4147-A177-3AD203B41FA5}">
-                      <a16:colId xmlns="" xmlns:a16="http://schemas.microsoft.com/office/drawing/2014/main" xmlns:a14="http://schemas.microsoft.com/office/drawing/2010/main" xmlns:mc="http://schemas.openxmlformats.org/markup-compatibility/2006" val="20004"/>
+                      <a16:colId xmlns:mc="http://schemas.openxmlformats.org/markup-compatibility/2006" xmlns:a14="http://schemas.microsoft.com/office/drawing/2010/main" xmlns:a16="http://schemas.microsoft.com/office/drawing/2014/main" xmlns="" val="20004"/>
                     </a:ext>
                   </a:extLst>
                 </a:gridCol>
@@ -7439,7 +7569,7 @@
                 </a:tc>
                 <a:extLst>
                   <a:ext uri="{0D108BD9-81ED-4DB2-BD59-A6C34878D82A}">
-                    <a16:rowId xmlns="" xmlns:a16="http://schemas.microsoft.com/office/drawing/2014/main" xmlns:a14="http://schemas.microsoft.com/office/drawing/2010/main" xmlns:mc="http://schemas.openxmlformats.org/markup-compatibility/2006" val="10000"/>
+                    <a16:rowId xmlns:mc="http://schemas.openxmlformats.org/markup-compatibility/2006" xmlns:a14="http://schemas.microsoft.com/office/drawing/2010/main" xmlns:a16="http://schemas.microsoft.com/office/drawing/2014/main" xmlns="" val="10000"/>
                   </a:ext>
                 </a:extLst>
               </a:tr>
@@ -7515,7 +7645,7 @@
                 </a:tc>
                 <a:extLst>
                   <a:ext uri="{0D108BD9-81ED-4DB2-BD59-A6C34878D82A}">
-                    <a16:rowId xmlns="" xmlns:a16="http://schemas.microsoft.com/office/drawing/2014/main" xmlns:a14="http://schemas.microsoft.com/office/drawing/2010/main" xmlns:mc="http://schemas.openxmlformats.org/markup-compatibility/2006" val="10001"/>
+                    <a16:rowId xmlns:mc="http://schemas.openxmlformats.org/markup-compatibility/2006" xmlns:a14="http://schemas.microsoft.com/office/drawing/2010/main" xmlns:a16="http://schemas.microsoft.com/office/drawing/2014/main" xmlns="" val="10001"/>
                   </a:ext>
                 </a:extLst>
               </a:tr>
@@ -7608,7 +7738,7 @@
                 </a:tc>
                 <a:extLst>
                   <a:ext uri="{0D108BD9-81ED-4DB2-BD59-A6C34878D82A}">
-                    <a16:rowId xmlns="" xmlns:a16="http://schemas.microsoft.com/office/drawing/2014/main" xmlns:a14="http://schemas.microsoft.com/office/drawing/2010/main" xmlns:mc="http://schemas.openxmlformats.org/markup-compatibility/2006" val="10002"/>
+                    <a16:rowId xmlns:mc="http://schemas.openxmlformats.org/markup-compatibility/2006" xmlns:a14="http://schemas.microsoft.com/office/drawing/2010/main" xmlns:a16="http://schemas.microsoft.com/office/drawing/2014/main" xmlns="" val="10002"/>
                   </a:ext>
                 </a:extLst>
               </a:tr>
@@ -7684,7 +7814,7 @@
                 </a:tc>
                 <a:extLst>
                   <a:ext uri="{0D108BD9-81ED-4DB2-BD59-A6C34878D82A}">
-                    <a16:rowId xmlns="" xmlns:a16="http://schemas.microsoft.com/office/drawing/2014/main" xmlns:a14="http://schemas.microsoft.com/office/drawing/2010/main" xmlns:mc="http://schemas.openxmlformats.org/markup-compatibility/2006" val="10003"/>
+                    <a16:rowId xmlns:mc="http://schemas.openxmlformats.org/markup-compatibility/2006" xmlns:a14="http://schemas.microsoft.com/office/drawing/2010/main" xmlns:a16="http://schemas.microsoft.com/office/drawing/2014/main" xmlns="" val="10003"/>
                   </a:ext>
                 </a:extLst>
               </a:tr>
@@ -7709,7 +7839,7 @@
           <a:p>
             <a:fld id="{9BF08E50-6CC6-4A91-911D-ECC366F28EE7}" type="slidenum">
               <a:rPr lang="en-US" smtClean="0"/>
-              <a:t>18</a:t>
+              <a:t>19</a:t>
             </a:fld>
             <a:endParaRPr lang="en-US"/>
           </a:p>
@@ -7792,7 +7922,345 @@
 </p:sld>
 </file>
 
-<file path=ppt/slides/slide19.xml><?xml version="1.0" encoding="utf-8"?>
+<file path=ppt/slides/slide2.xml><?xml version="1.0" encoding="utf-8"?>
+<p:sld xmlns:a="http://schemas.openxmlformats.org/drawingml/2006/main" xmlns:r="http://schemas.openxmlformats.org/officeDocument/2006/relationships" xmlns:p="http://schemas.openxmlformats.org/presentationml/2006/main">
+  <p:cSld>
+    <p:spTree>
+      <p:nvGrpSpPr>
+        <p:cNvPr id="1" name=""/>
+        <p:cNvGrpSpPr/>
+        <p:nvPr/>
+      </p:nvGrpSpPr>
+      <p:grpSpPr>
+        <a:xfrm>
+          <a:off x="0" y="0"/>
+          <a:ext cx="0" cy="0"/>
+          <a:chOff x="0" y="0"/>
+          <a:chExt cx="0" cy="0"/>
+        </a:xfrm>
+      </p:grpSpPr>
+      <p:sp>
+        <p:nvSpPr>
+          <p:cNvPr id="2" name="Title 1"/>
+          <p:cNvSpPr>
+            <a:spLocks noGrp="1"/>
+          </p:cNvSpPr>
+          <p:nvPr>
+            <p:ph type="title"/>
+          </p:nvPr>
+        </p:nvSpPr>
+        <p:spPr/>
+        <p:txBody>
+          <a:bodyPr>
+            <a:normAutofit/>
+          </a:bodyPr>
+          <a:lstStyle/>
+          <a:p>
+            <a:r>
+              <a:rPr lang="en-US" altLang="zh-CN" sz="5400" b="1" dirty="0">
+                <a:solidFill>
+                  <a:srgbClr val="000099"/>
+                </a:solidFill>
+                <a:latin typeface="Palatino Linotype" pitchFamily="18" charset="0"/>
+              </a:rPr>
+              <a:t>ANOVA</a:t>
+            </a:r>
+            <a:endParaRPr lang="en-US" sz="5400" dirty="0">
+              <a:latin typeface="Palatino Linotype" pitchFamily="18" charset="0"/>
+            </a:endParaRPr>
+          </a:p>
+        </p:txBody>
+      </p:sp>
+      <p:sp>
+        <p:nvSpPr>
+          <p:cNvPr id="3" name="Content Placeholder 2"/>
+          <p:cNvSpPr>
+            <a:spLocks noGrp="1"/>
+          </p:cNvSpPr>
+          <p:nvPr>
+            <p:ph idx="1"/>
+          </p:nvPr>
+        </p:nvSpPr>
+        <p:spPr/>
+        <p:txBody>
+          <a:bodyPr>
+            <a:normAutofit lnSpcReduction="10000"/>
+          </a:bodyPr>
+          <a:lstStyle/>
+          <a:p>
+            <a:r>
+              <a:rPr lang="en-US" dirty="0">
+                <a:solidFill>
+                  <a:srgbClr val="FF0000"/>
+                </a:solidFill>
+                <a:latin typeface="Palatino Linotype" pitchFamily="18" charset="0"/>
+              </a:rPr>
+              <a:t>An</a:t>
+            </a:r>
+            <a:r>
+              <a:rPr lang="en-US" dirty="0">
+                <a:latin typeface="Palatino Linotype" pitchFamily="18" charset="0"/>
+              </a:rPr>
+              <a:t>alysis </a:t>
+            </a:r>
+            <a:r>
+              <a:rPr lang="en-US" dirty="0">
+                <a:solidFill>
+                  <a:srgbClr val="FF0000"/>
+                </a:solidFill>
+                <a:latin typeface="Palatino Linotype" pitchFamily="18" charset="0"/>
+              </a:rPr>
+              <a:t>O</a:t>
+            </a:r>
+            <a:r>
+              <a:rPr lang="en-US" dirty="0">
+                <a:latin typeface="Palatino Linotype" pitchFamily="18" charset="0"/>
+              </a:rPr>
+              <a:t>f </a:t>
+            </a:r>
+            <a:r>
+              <a:rPr lang="en-US" dirty="0">
+                <a:solidFill>
+                  <a:srgbClr val="FF0000"/>
+                </a:solidFill>
+                <a:latin typeface="Palatino Linotype" pitchFamily="18" charset="0"/>
+              </a:rPr>
+              <a:t>Va</a:t>
+            </a:r>
+            <a:r>
+              <a:rPr lang="en-US" dirty="0">
+                <a:latin typeface="Palatino Linotype" pitchFamily="18" charset="0"/>
+              </a:rPr>
+              <a:t>riance (ANOVA)</a:t>
+            </a:r>
+          </a:p>
+          <a:p>
+            <a:r>
+              <a:rPr lang="en-US" dirty="0">
+                <a:latin typeface="Palatino Linotype" pitchFamily="18" charset="0"/>
+              </a:rPr>
+              <a:t>Generalization of </a:t>
+            </a:r>
+            <a:r>
+              <a:rPr lang="en-US" i="1" dirty="0">
+                <a:latin typeface="Palatino Linotype" pitchFamily="18" charset="0"/>
+              </a:rPr>
+              <a:t>t</a:t>
+            </a:r>
+            <a:r>
+              <a:rPr lang="en-US" dirty="0">
+                <a:latin typeface="Palatino Linotype" pitchFamily="18" charset="0"/>
+              </a:rPr>
+              <a:t> Test to independent variables with 2+ categories</a:t>
+            </a:r>
+          </a:p>
+          <a:p>
+            <a:pPr lvl="1"/>
+            <a:r>
+              <a:rPr lang="en-US" dirty="0">
+                <a:latin typeface="Palatino Linotype" pitchFamily="18" charset="0"/>
+              </a:rPr>
+              <a:t>A family of statistical models that examine differences between groups using variance components</a:t>
+            </a:r>
+          </a:p>
+          <a:p>
+            <a:pPr lvl="1"/>
+            <a:r>
+              <a:rPr lang="en-US" dirty="0">
+                <a:latin typeface="Palatino Linotype" pitchFamily="18" charset="0"/>
+              </a:rPr>
+              <a:t>Today, we will learn “one-way ANOVA”.</a:t>
+            </a:r>
+          </a:p>
+          <a:p>
+            <a:pPr lvl="2"/>
+            <a:r>
+              <a:rPr lang="ja-JP" altLang="en-US" dirty="0">
+                <a:latin typeface="Palatino Linotype" pitchFamily="18" charset="0"/>
+              </a:rPr>
+              <a:t>“</a:t>
+            </a:r>
+            <a:r>
+              <a:rPr lang="en-US" altLang="ja-JP" dirty="0">
+                <a:latin typeface="Palatino Linotype" pitchFamily="18" charset="0"/>
+              </a:rPr>
+              <a:t>One-way</a:t>
+            </a:r>
+            <a:r>
+              <a:rPr lang="ja-JP" altLang="en-US" dirty="0">
+                <a:latin typeface="Palatino Linotype" pitchFamily="18" charset="0"/>
+              </a:rPr>
+              <a:t>”</a:t>
+            </a:r>
+            <a:r>
+              <a:rPr lang="en-US" altLang="ja-JP" dirty="0">
+                <a:latin typeface="Palatino Linotype" pitchFamily="18" charset="0"/>
+              </a:rPr>
+              <a:t> refers to one factor.</a:t>
+            </a:r>
+          </a:p>
+          <a:p>
+            <a:pPr lvl="2"/>
+            <a:r>
+              <a:rPr lang="en-US" u="sng" dirty="0">
+                <a:latin typeface="Palatino Linotype" pitchFamily="18" charset="0"/>
+              </a:rPr>
+              <a:t>Factor</a:t>
+            </a:r>
+            <a:r>
+              <a:rPr lang="en-US" dirty="0">
+                <a:latin typeface="Palatino Linotype" pitchFamily="18" charset="0"/>
+              </a:rPr>
+              <a:t> = a categorical variable that distinguishes the groups. </a:t>
+            </a:r>
+          </a:p>
+          <a:p>
+            <a:pPr lvl="1"/>
+            <a:endParaRPr lang="en-US" dirty="0">
+              <a:latin typeface="Palatino Linotype" pitchFamily="18" charset="0"/>
+            </a:endParaRPr>
+          </a:p>
+        </p:txBody>
+      </p:sp>
+      <p:sp>
+        <p:nvSpPr>
+          <p:cNvPr id="4" name="Slide Number Placeholder 3"/>
+          <p:cNvSpPr>
+            <a:spLocks noGrp="1"/>
+          </p:cNvSpPr>
+          <p:nvPr>
+            <p:ph type="sldNum" sz="quarter" idx="12"/>
+          </p:nvPr>
+        </p:nvSpPr>
+        <p:spPr/>
+        <p:txBody>
+          <a:bodyPr/>
+          <a:lstStyle/>
+          <a:p>
+            <a:fld id="{9BF08E50-6CC6-4A91-911D-ECC366F28EE7}" type="slidenum">
+              <a:rPr lang="en-US" smtClean="0"/>
+              <a:t>2</a:t>
+            </a:fld>
+            <a:endParaRPr lang="en-US"/>
+          </a:p>
+        </p:txBody>
+      </p:sp>
+    </p:spTree>
+    <p:extLst>
+      <p:ext uri="{BB962C8B-B14F-4D97-AF65-F5344CB8AC3E}">
+        <p14:creationId xmlns:p14="http://schemas.microsoft.com/office/powerpoint/2010/main" val="2638762181"/>
+      </p:ext>
+    </p:extLst>
+  </p:cSld>
+  <p:clrMapOvr>
+    <a:masterClrMapping/>
+  </p:clrMapOvr>
+</p:sld>
+</file>
+
+<file path=ppt/slides/slide20.xml><?xml version="1.0" encoding="utf-8"?>
+<p:sld xmlns:a="http://schemas.openxmlformats.org/drawingml/2006/main" xmlns:r="http://schemas.openxmlformats.org/officeDocument/2006/relationships" xmlns:p="http://schemas.openxmlformats.org/presentationml/2006/main">
+  <p:cSld>
+    <p:spTree>
+      <p:nvGrpSpPr>
+        <p:cNvPr id="1" name=""/>
+        <p:cNvGrpSpPr/>
+        <p:nvPr/>
+      </p:nvGrpSpPr>
+      <p:grpSpPr>
+        <a:xfrm>
+          <a:off x="0" y="0"/>
+          <a:ext cx="0" cy="0"/>
+          <a:chOff x="0" y="0"/>
+          <a:chExt cx="0" cy="0"/>
+        </a:xfrm>
+      </p:grpSpPr>
+      <p:sp>
+        <p:nvSpPr>
+          <p:cNvPr id="2" name="Title 1"/>
+          <p:cNvSpPr>
+            <a:spLocks noGrp="1"/>
+          </p:cNvSpPr>
+          <p:nvPr>
+            <p:ph type="title"/>
+          </p:nvPr>
+        </p:nvSpPr>
+        <p:spPr/>
+        <p:txBody>
+          <a:bodyPr/>
+          <a:lstStyle/>
+          <a:p>
+            <a:endParaRPr lang="en-US"/>
+          </a:p>
+        </p:txBody>
+      </p:sp>
+      <p:sp>
+        <p:nvSpPr>
+          <p:cNvPr id="4" name="Slide Number Placeholder 3"/>
+          <p:cNvSpPr>
+            <a:spLocks noGrp="1"/>
+          </p:cNvSpPr>
+          <p:nvPr>
+            <p:ph type="sldNum" sz="quarter" idx="12"/>
+          </p:nvPr>
+        </p:nvSpPr>
+        <p:spPr/>
+        <p:txBody>
+          <a:bodyPr/>
+          <a:lstStyle/>
+          <a:p>
+            <a:fld id="{71E0F468-36C2-4A31-ABC4-3235B7B5704F}" type="slidenum">
+              <a:rPr lang="en-US" smtClean="0"/>
+              <a:t>20</a:t>
+            </a:fld>
+            <a:endParaRPr lang="en-US"/>
+          </a:p>
+        </p:txBody>
+      </p:sp>
+      <p:pic>
+        <p:nvPicPr>
+          <p:cNvPr id="5" name="Picture 4" descr="Screen Shot 2018-04-17 at 9.23.03 AM.png"/>
+          <p:cNvPicPr>
+            <a:picLocks noChangeAspect="1"/>
+          </p:cNvPicPr>
+          <p:nvPr/>
+        </p:nvPicPr>
+        <p:blipFill>
+          <a:blip r:embed="rId2">
+            <a:extLst>
+              <a:ext uri="{28A0092B-C50C-407E-A947-70E740481C1C}">
+                <a14:useLocalDpi xmlns:a14="http://schemas.microsoft.com/office/drawing/2010/main" val="0"/>
+              </a:ext>
+            </a:extLst>
+          </a:blip>
+          <a:stretch>
+            <a:fillRect/>
+          </a:stretch>
+        </p:blipFill>
+        <p:spPr>
+          <a:xfrm>
+            <a:off x="0" y="38100"/>
+            <a:ext cx="9144000" cy="6777463"/>
+          </a:xfrm>
+          <a:prstGeom prst="rect">
+            <a:avLst/>
+          </a:prstGeom>
+        </p:spPr>
+      </p:pic>
+    </p:spTree>
+    <p:extLst>
+      <p:ext uri="{BB962C8B-B14F-4D97-AF65-F5344CB8AC3E}">
+        <p14:creationId xmlns:p14="http://schemas.microsoft.com/office/powerpoint/2010/main" val="1885145615"/>
+      </p:ext>
+    </p:extLst>
+  </p:cSld>
+  <p:clrMapOvr>
+    <a:masterClrMapping/>
+  </p:clrMapOvr>
+</p:sld>
+</file>
+
+<file path=ppt/slides/slide21.xml><?xml version="1.0" encoding="utf-8"?>
 <p:sld xmlns:a="http://schemas.openxmlformats.org/drawingml/2006/main" xmlns:r="http://schemas.openxmlformats.org/officeDocument/2006/relationships" xmlns:p="http://schemas.openxmlformats.org/presentationml/2006/main">
   <p:cSld>
     <p:spTree>
@@ -8077,7 +8545,7 @@
               <a:rPr lang="en-US" smtClean="0">
                 <a:latin typeface="Palatino Linotype" pitchFamily="18" charset="0"/>
               </a:rPr>
-              <a:t>19</a:t>
+              <a:t>21</a:t>
             </a:fld>
             <a:endParaRPr lang="en-US">
               <a:latin typeface="Palatino Linotype" pitchFamily="18" charset="0"/>
@@ -8274,243 +8742,7 @@
 </p:sld>
 </file>
 
-<file path=ppt/slides/slide2.xml><?xml version="1.0" encoding="utf-8"?>
-<p:sld xmlns:a="http://schemas.openxmlformats.org/drawingml/2006/main" xmlns:r="http://schemas.openxmlformats.org/officeDocument/2006/relationships" xmlns:p="http://schemas.openxmlformats.org/presentationml/2006/main">
-  <p:cSld>
-    <p:spTree>
-      <p:nvGrpSpPr>
-        <p:cNvPr id="1" name=""/>
-        <p:cNvGrpSpPr/>
-        <p:nvPr/>
-      </p:nvGrpSpPr>
-      <p:grpSpPr>
-        <a:xfrm>
-          <a:off x="0" y="0"/>
-          <a:ext cx="0" cy="0"/>
-          <a:chOff x="0" y="0"/>
-          <a:chExt cx="0" cy="0"/>
-        </a:xfrm>
-      </p:grpSpPr>
-      <p:sp>
-        <p:nvSpPr>
-          <p:cNvPr id="2" name="Title 1"/>
-          <p:cNvSpPr>
-            <a:spLocks noGrp="1"/>
-          </p:cNvSpPr>
-          <p:nvPr>
-            <p:ph type="title"/>
-          </p:nvPr>
-        </p:nvSpPr>
-        <p:spPr/>
-        <p:txBody>
-          <a:bodyPr>
-            <a:normAutofit/>
-          </a:bodyPr>
-          <a:lstStyle/>
-          <a:p>
-            <a:r>
-              <a:rPr lang="en-US" altLang="zh-CN" sz="5400" b="1" dirty="0">
-                <a:solidFill>
-                  <a:srgbClr val="000099"/>
-                </a:solidFill>
-                <a:latin typeface="Palatino Linotype" pitchFamily="18" charset="0"/>
-              </a:rPr>
-              <a:t>ANOVA</a:t>
-            </a:r>
-            <a:endParaRPr lang="en-US" sz="5400" dirty="0">
-              <a:latin typeface="Palatino Linotype" pitchFamily="18" charset="0"/>
-            </a:endParaRPr>
-          </a:p>
-        </p:txBody>
-      </p:sp>
-      <p:sp>
-        <p:nvSpPr>
-          <p:cNvPr id="3" name="Content Placeholder 2"/>
-          <p:cNvSpPr>
-            <a:spLocks noGrp="1"/>
-          </p:cNvSpPr>
-          <p:nvPr>
-            <p:ph idx="1"/>
-          </p:nvPr>
-        </p:nvSpPr>
-        <p:spPr/>
-        <p:txBody>
-          <a:bodyPr>
-            <a:normAutofit lnSpcReduction="10000"/>
-          </a:bodyPr>
-          <a:lstStyle/>
-          <a:p>
-            <a:r>
-              <a:rPr lang="en-US" dirty="0">
-                <a:solidFill>
-                  <a:srgbClr val="FF0000"/>
-                </a:solidFill>
-                <a:latin typeface="Palatino Linotype" pitchFamily="18" charset="0"/>
-              </a:rPr>
-              <a:t>An</a:t>
-            </a:r>
-            <a:r>
-              <a:rPr lang="en-US" dirty="0">
-                <a:latin typeface="Palatino Linotype" pitchFamily="18" charset="0"/>
-              </a:rPr>
-              <a:t>alysis </a:t>
-            </a:r>
-            <a:r>
-              <a:rPr lang="en-US" dirty="0">
-                <a:solidFill>
-                  <a:srgbClr val="FF0000"/>
-                </a:solidFill>
-                <a:latin typeface="Palatino Linotype" pitchFamily="18" charset="0"/>
-              </a:rPr>
-              <a:t>O</a:t>
-            </a:r>
-            <a:r>
-              <a:rPr lang="en-US" dirty="0">
-                <a:latin typeface="Palatino Linotype" pitchFamily="18" charset="0"/>
-              </a:rPr>
-              <a:t>f </a:t>
-            </a:r>
-            <a:r>
-              <a:rPr lang="en-US" dirty="0">
-                <a:solidFill>
-                  <a:srgbClr val="FF0000"/>
-                </a:solidFill>
-                <a:latin typeface="Palatino Linotype" pitchFamily="18" charset="0"/>
-              </a:rPr>
-              <a:t>Va</a:t>
-            </a:r>
-            <a:r>
-              <a:rPr lang="en-US" dirty="0">
-                <a:latin typeface="Palatino Linotype" pitchFamily="18" charset="0"/>
-              </a:rPr>
-              <a:t>riance (ANOVA)</a:t>
-            </a:r>
-          </a:p>
-          <a:p>
-            <a:r>
-              <a:rPr lang="en-US" dirty="0">
-                <a:latin typeface="Palatino Linotype" pitchFamily="18" charset="0"/>
-              </a:rPr>
-              <a:t>Generalization of </a:t>
-            </a:r>
-            <a:r>
-              <a:rPr lang="en-US" i="1" dirty="0">
-                <a:latin typeface="Palatino Linotype" pitchFamily="18" charset="0"/>
-              </a:rPr>
-              <a:t>t</a:t>
-            </a:r>
-            <a:r>
-              <a:rPr lang="en-US" dirty="0">
-                <a:latin typeface="Palatino Linotype" pitchFamily="18" charset="0"/>
-              </a:rPr>
-              <a:t> Test to independent variables with 2+ categories</a:t>
-            </a:r>
-          </a:p>
-          <a:p>
-            <a:pPr lvl="1"/>
-            <a:r>
-              <a:rPr lang="en-US" dirty="0">
-                <a:latin typeface="Palatino Linotype" pitchFamily="18" charset="0"/>
-              </a:rPr>
-              <a:t>A family of statistical models that examine differences between groups using variance components</a:t>
-            </a:r>
-          </a:p>
-          <a:p>
-            <a:pPr lvl="1"/>
-            <a:r>
-              <a:rPr lang="en-US" dirty="0">
-                <a:latin typeface="Palatino Linotype" pitchFamily="18" charset="0"/>
-              </a:rPr>
-              <a:t>Today, we will learn “one-way ANOVA”.</a:t>
-            </a:r>
-          </a:p>
-          <a:p>
-            <a:pPr lvl="2"/>
-            <a:r>
-              <a:rPr lang="ja-JP" altLang="en-US" dirty="0">
-                <a:latin typeface="Palatino Linotype" pitchFamily="18" charset="0"/>
-              </a:rPr>
-              <a:t>“</a:t>
-            </a:r>
-            <a:r>
-              <a:rPr lang="en-US" altLang="ja-JP" dirty="0">
-                <a:latin typeface="Palatino Linotype" pitchFamily="18" charset="0"/>
-              </a:rPr>
-              <a:t>One-way</a:t>
-            </a:r>
-            <a:r>
-              <a:rPr lang="ja-JP" altLang="en-US" dirty="0">
-                <a:latin typeface="Palatino Linotype" pitchFamily="18" charset="0"/>
-              </a:rPr>
-              <a:t>”</a:t>
-            </a:r>
-            <a:r>
-              <a:rPr lang="en-US" altLang="ja-JP" dirty="0">
-                <a:latin typeface="Palatino Linotype" pitchFamily="18" charset="0"/>
-              </a:rPr>
-              <a:t> refers to one factor.</a:t>
-            </a:r>
-          </a:p>
-          <a:p>
-            <a:pPr lvl="2"/>
-            <a:r>
-              <a:rPr lang="en-US" u="sng" dirty="0">
-                <a:latin typeface="Palatino Linotype" pitchFamily="18" charset="0"/>
-              </a:rPr>
-              <a:t>Factor</a:t>
-            </a:r>
-            <a:r>
-              <a:rPr lang="en-US" dirty="0">
-                <a:latin typeface="Palatino Linotype" pitchFamily="18" charset="0"/>
-              </a:rPr>
-              <a:t> = a categorical variable that distinguishes the groups. </a:t>
-            </a:r>
-          </a:p>
-          <a:p>
-            <a:pPr lvl="1"/>
-            <a:endParaRPr lang="en-US" dirty="0">
-              <a:latin typeface="Palatino Linotype" pitchFamily="18" charset="0"/>
-            </a:endParaRPr>
-          </a:p>
-        </p:txBody>
-      </p:sp>
-      <p:sp>
-        <p:nvSpPr>
-          <p:cNvPr id="4" name="Slide Number Placeholder 3"/>
-          <p:cNvSpPr>
-            <a:spLocks noGrp="1"/>
-          </p:cNvSpPr>
-          <p:nvPr>
-            <p:ph type="sldNum" sz="quarter" idx="12"/>
-          </p:nvPr>
-        </p:nvSpPr>
-        <p:spPr/>
-        <p:txBody>
-          <a:bodyPr/>
-          <a:lstStyle/>
-          <a:p>
-            <a:fld id="{9BF08E50-6CC6-4A91-911D-ECC366F28EE7}" type="slidenum">
-              <a:rPr lang="en-US" smtClean="0"/>
-              <a:t>2</a:t>
-            </a:fld>
-            <a:endParaRPr lang="en-US"/>
-          </a:p>
-        </p:txBody>
-      </p:sp>
-    </p:spTree>
-    <p:extLst>
-      <p:ext uri="{BB962C8B-B14F-4D97-AF65-F5344CB8AC3E}">
-        <p14:creationId xmlns:p14="http://schemas.microsoft.com/office/powerpoint/2010/main" val="2638762181"/>
-      </p:ext>
-    </p:extLst>
-  </p:cSld>
-  <p:clrMapOvr>
-    <a:masterClrMapping/>
-  </p:clrMapOvr>
-</p:sld>
-</file>
-
-<file path=ppt/slides/slide20.xml><?xml version="1.0" encoding="utf-8"?>
+<file path=ppt/slides/slide22.xml><?xml version="1.0" encoding="utf-8"?>
 <p:sld xmlns:a="http://schemas.openxmlformats.org/drawingml/2006/main" xmlns:r="http://schemas.openxmlformats.org/officeDocument/2006/relationships" xmlns:p="http://schemas.openxmlformats.org/presentationml/2006/main">
   <p:cSld>
     <p:spTree>
@@ -8791,7 +9023,7 @@
               <a:rPr lang="en-US" smtClean="0">
                 <a:latin typeface="Palatino Linotype" pitchFamily="18" charset="0"/>
               </a:rPr>
-              <a:t>20</a:t>
+              <a:t>22</a:t>
             </a:fld>
             <a:endParaRPr lang="en-US">
               <a:latin typeface="Palatino Linotype" pitchFamily="18" charset="0"/>
@@ -9205,7 +9437,7 @@
 </p:sld>
 </file>
 
-<file path=ppt/slides/slide21.xml><?xml version="1.0" encoding="utf-8"?>
+<file path=ppt/slides/slide23.xml><?xml version="1.0" encoding="utf-8"?>
 <p:sld xmlns:a="http://schemas.openxmlformats.org/drawingml/2006/main" xmlns:r="http://schemas.openxmlformats.org/officeDocument/2006/relationships" xmlns:p="http://schemas.openxmlformats.org/presentationml/2006/main">
   <p:cSld>
     <p:spTree>
@@ -9545,7 +9777,7 @@
               <a:rPr lang="en-US" smtClean="0">
                 <a:latin typeface="Palatino Linotype" pitchFamily="18" charset="0"/>
               </a:rPr>
-              <a:t>21</a:t>
+              <a:t>23</a:t>
             </a:fld>
             <a:endParaRPr lang="en-US">
               <a:latin typeface="Palatino Linotype" pitchFamily="18" charset="0"/>
@@ -9920,7 +10152,7 @@
 </p:sld>
 </file>
 
-<file path=ppt/slides/slide22.xml><?xml version="1.0" encoding="utf-8"?>
+<file path=ppt/slides/slide24.xml><?xml version="1.0" encoding="utf-8"?>
 <p:sld xmlns:a="http://schemas.openxmlformats.org/drawingml/2006/main" xmlns:r="http://schemas.openxmlformats.org/officeDocument/2006/relationships" xmlns:p="http://schemas.openxmlformats.org/presentationml/2006/main" showMasterPhAnim="0">
   <p:cSld>
     <p:spTree>
@@ -10048,13 +10280,13 @@
               <a:buNone/>
             </a:pPr>
             <a:r>
-              <a:rPr lang="en-US" sz="2600" dirty="0" err="1">
+              <a:rPr lang="en-US" sz="2600" dirty="0">
                 <a:latin typeface="Palatino Linotype" pitchFamily="18" charset="0"/>
               </a:rPr>
               <a:t>SS</a:t>
             </a:r>
             <a:r>
-              <a:rPr lang="en-US" sz="2600" baseline="-25000" dirty="0" err="1">
+              <a:rPr lang="en-US" sz="2600" baseline="-25000" dirty="0">
                 <a:latin typeface="Palatino Linotype" pitchFamily="18" charset="0"/>
               </a:rPr>
               <a:t>B</a:t>
@@ -10101,19 +10333,30 @@
               <a:t>+…+(12-10.06) </a:t>
             </a:r>
             <a:r>
-              <a:rPr lang="en-US" sz="2200" baseline="30000" dirty="0">
+              <a:rPr lang="en-US" sz="2200" baseline="30000" dirty="0" smtClean="0">
                 <a:latin typeface="Palatino Linotype" pitchFamily="18" charset="0"/>
                 <a:sym typeface="Symbol" pitchFamily="18" charset="2"/>
               </a:rPr>
               <a:t>2</a:t>
             </a:r>
             <a:r>
-              <a:rPr lang="en-US" sz="2600" baseline="30000" dirty="0">
+              <a:rPr lang="en-US" sz="2600" baseline="30000" dirty="0" smtClean="0">
                 <a:latin typeface="Palatino Linotype" pitchFamily="18" charset="0"/>
                 <a:sym typeface="Symbol" pitchFamily="18" charset="2"/>
               </a:rPr>
               <a:t> </a:t>
             </a:r>
+            <a:r>
+              <a:rPr lang="en-US" sz="2600" dirty="0" smtClean="0">
+                <a:latin typeface="Palatino Linotype" pitchFamily="18" charset="0"/>
+                <a:sym typeface="Symbol" pitchFamily="18" charset="2"/>
+              </a:rPr>
+              <a:t>)</a:t>
+            </a:r>
+            <a:endParaRPr lang="en-US" sz="2600" baseline="30000" dirty="0">
+              <a:latin typeface="Palatino Linotype" pitchFamily="18" charset="0"/>
+              <a:sym typeface="Symbol" pitchFamily="18" charset="2"/>
+            </a:endParaRPr>
           </a:p>
           <a:p>
             <a:pPr>
@@ -10180,16 +10423,10 @@
               <a:rPr lang="en-US" sz="2600" dirty="0">
                 <a:latin typeface="Palatino Linotype" pitchFamily="18" charset="0"/>
               </a:rPr>
-              <a:t>- </a:t>
-            </a:r>
-            <a:r>
-              <a:rPr lang="en-US" sz="2600">
-                <a:latin typeface="Palatino Linotype" pitchFamily="18" charset="0"/>
-              </a:rPr>
-              <a:t>SS</a:t>
-            </a:r>
-            <a:r>
-              <a:rPr lang="en-US" sz="2600" baseline="-25000">
+              <a:t>- SS</a:t>
+            </a:r>
+            <a:r>
+              <a:rPr lang="en-US" sz="2600" baseline="-25000" dirty="0">
                 <a:latin typeface="Palatino Linotype" pitchFamily="18" charset="0"/>
               </a:rPr>
               <a:t>B </a:t>
@@ -10226,7 +10463,7 @@
           <a:graphicData uri="http://schemas.openxmlformats.org/presentationml/2006/ole">
             <mc:AlternateContent xmlns:mc="http://schemas.openxmlformats.org/markup-compatibility/2006">
               <mc:Choice xmlns:v="urn:schemas-microsoft-com:vml" Requires="v">
-                <p:oleObj spid="_x0000_s11406" name="Worksheet" r:id="rId3" imgW="6647688" imgH="2340864" progId="Excel.Sheet.8">
+                <p:oleObj spid="_x0000_s11461" name="Worksheet" r:id="rId3" imgW="6647688" imgH="2340864" progId="Excel.Sheet.8">
                   <p:embed/>
                 </p:oleObj>
               </mc:Choice>
@@ -10456,7 +10693,7 @@
           <a:graphicData uri="http://schemas.openxmlformats.org/presentationml/2006/ole">
             <mc:AlternateContent xmlns:mc="http://schemas.openxmlformats.org/markup-compatibility/2006">
               <mc:Choice xmlns:v="urn:schemas-microsoft-com:vml" Requires="v">
-                <p:oleObj spid="_x0000_s11407" name="Worksheet" r:id="rId5" imgW="3756577" imgH="662904" progId="Excel.Sheet.8">
+                <p:oleObj spid="_x0000_s11462" name="Worksheet" r:id="rId5" imgW="3756577" imgH="662904" progId="Excel.Sheet.8">
                   <p:embed/>
                 </p:oleObj>
               </mc:Choice>
@@ -10544,7 +10781,7 @@
           <a:p>
             <a:fld id="{71E0F468-36C2-4A31-ABC4-3235B7B5704F}" type="slidenum">
               <a:rPr lang="en-US" smtClean="0"/>
-              <a:t>22</a:t>
+              <a:t>24</a:t>
             </a:fld>
             <a:endParaRPr lang="en-US"/>
           </a:p>
@@ -10886,7 +11123,7 @@
 </p:sld>
 </file>
 
-<file path=ppt/slides/slide23.xml><?xml version="1.0" encoding="utf-8"?>
+<file path=ppt/slides/slide25.xml><?xml version="1.0" encoding="utf-8"?>
 <p:sld xmlns:a="http://schemas.openxmlformats.org/drawingml/2006/main" xmlns:r="http://schemas.openxmlformats.org/officeDocument/2006/relationships" xmlns:p="http://schemas.openxmlformats.org/presentationml/2006/main">
   <p:cSld>
     <p:spTree>
@@ -11121,7 +11358,7 @@
               <a:rPr lang="en-US" smtClean="0">
                 <a:latin typeface="Palatino Linotype" pitchFamily="18" charset="0"/>
               </a:rPr>
-              <a:t>23</a:t>
+              <a:t>25</a:t>
             </a:fld>
             <a:endParaRPr lang="en-US">
               <a:latin typeface="Palatino Linotype" pitchFamily="18" charset="0"/>
@@ -11222,7 +11459,7 @@
 </p:sld>
 </file>
 
-<file path=ppt/slides/slide24.xml><?xml version="1.0" encoding="utf-8"?>
+<file path=ppt/slides/slide26.xml><?xml version="1.0" encoding="utf-8"?>
 <p:sld xmlns:a="http://schemas.openxmlformats.org/drawingml/2006/main" xmlns:r="http://schemas.openxmlformats.org/officeDocument/2006/relationships" xmlns:p="http://schemas.openxmlformats.org/presentationml/2006/main">
   <p:cSld>
     <p:spTree>
@@ -11386,7 +11623,7 @@
           <a:p>
             <a:fld id="{71E0F468-36C2-4A31-ABC4-3235B7B5704F}" type="slidenum">
               <a:rPr lang="en-US" smtClean="0"/>
-              <a:t>24</a:t>
+              <a:t>26</a:t>
             </a:fld>
             <a:endParaRPr lang="en-US"/>
           </a:p>
@@ -11405,7 +11642,7 @@
 </p:sld>
 </file>
 
-<file path=ppt/slides/slide25.xml><?xml version="1.0" encoding="utf-8"?>
+<file path=ppt/slides/slide27.xml><?xml version="1.0" encoding="utf-8"?>
 <p:sld xmlns:a="http://schemas.openxmlformats.org/drawingml/2006/main" xmlns:r="http://schemas.openxmlformats.org/officeDocument/2006/relationships" xmlns:p="http://schemas.openxmlformats.org/presentationml/2006/main">
   <p:cSld>
     <p:spTree>
@@ -11602,7 +11839,7 @@
           <a:graphicData uri="http://schemas.openxmlformats.org/presentationml/2006/ole">
             <mc:AlternateContent xmlns:mc="http://schemas.openxmlformats.org/markup-compatibility/2006">
               <mc:Choice xmlns:v="urn:schemas-microsoft-com:vml" Requires="v">
-                <p:oleObj spid="_x0000_s12357" name="Equation" r:id="rId3" imgW="609480" imgH="431640" progId="Equation.DSMT4">
+                <p:oleObj spid="_x0000_s12385" name="Equation" r:id="rId3" imgW="609480" imgH="431640" progId="Equation.DSMT4">
                   <p:embed/>
                 </p:oleObj>
               </mc:Choice>
@@ -11654,7 +11891,7 @@
           <a:p>
             <a:fld id="{71E0F468-36C2-4A31-ABC4-3235B7B5704F}" type="slidenum">
               <a:rPr lang="en-US" smtClean="0"/>
-              <a:t>25</a:t>
+              <a:t>27</a:t>
             </a:fld>
             <a:endParaRPr lang="en-US"/>
           </a:p>
@@ -11673,7 +11910,7 @@
 </p:sld>
 </file>
 
-<file path=ppt/slides/slide26.xml><?xml version="1.0" encoding="utf-8"?>
+<file path=ppt/slides/slide28.xml><?xml version="1.0" encoding="utf-8"?>
 <p:sld xmlns:a="http://schemas.openxmlformats.org/drawingml/2006/main" xmlns:r="http://schemas.openxmlformats.org/officeDocument/2006/relationships" xmlns:p="http://schemas.openxmlformats.org/presentationml/2006/main">
   <p:cSld>
     <p:spTree>
@@ -11919,7 +12156,7 @@
           <a:graphicData uri="http://schemas.openxmlformats.org/presentationml/2006/ole">
             <mc:AlternateContent xmlns:mc="http://schemas.openxmlformats.org/markup-compatibility/2006">
               <mc:Choice xmlns:v="urn:schemas-microsoft-com:vml" Requires="v">
-                <p:oleObj spid="_x0000_s6229" name="Equation" r:id="rId3" imgW="126720" imgH="126720" progId="Equation.DSMT4">
+                <p:oleObj spid="_x0000_s6257" name="Equation" r:id="rId3" imgW="126720" imgH="126720" progId="Equation.DSMT4">
                   <p:embed/>
                 </p:oleObj>
               </mc:Choice>
@@ -11973,7 +12210,7 @@
               <a:rPr lang="en-US" smtClean="0">
                 <a:latin typeface="Palatino Linotype" pitchFamily="18" charset="0"/>
               </a:rPr>
-              <a:t>26</a:t>
+              <a:t>28</a:t>
             </a:fld>
             <a:endParaRPr lang="en-US">
               <a:latin typeface="Palatino Linotype" pitchFamily="18" charset="0"/>
@@ -11985,371 +12222,6 @@
     <p:extLst>
       <p:ext uri="{BB962C8B-B14F-4D97-AF65-F5344CB8AC3E}">
         <p14:creationId xmlns:p14="http://schemas.microsoft.com/office/powerpoint/2010/main" val="353061370"/>
-      </p:ext>
-    </p:extLst>
-  </p:cSld>
-  <p:clrMapOvr>
-    <a:masterClrMapping/>
-  </p:clrMapOvr>
-</p:sld>
-</file>
-
-<file path=ppt/slides/slide27.xml><?xml version="1.0" encoding="utf-8"?>
-<p:sld xmlns:a="http://schemas.openxmlformats.org/drawingml/2006/main" xmlns:r="http://schemas.openxmlformats.org/officeDocument/2006/relationships" xmlns:p="http://schemas.openxmlformats.org/presentationml/2006/main">
-  <p:cSld>
-    <p:spTree>
-      <p:nvGrpSpPr>
-        <p:cNvPr id="1" name=""/>
-        <p:cNvGrpSpPr/>
-        <p:nvPr/>
-      </p:nvGrpSpPr>
-      <p:grpSpPr>
-        <a:xfrm>
-          <a:off x="0" y="0"/>
-          <a:ext cx="0" cy="0"/>
-          <a:chOff x="0" y="0"/>
-          <a:chExt cx="0" cy="0"/>
-        </a:xfrm>
-      </p:grpSpPr>
-      <p:sp>
-        <p:nvSpPr>
-          <p:cNvPr id="2" name="Title 1"/>
-          <p:cNvSpPr>
-            <a:spLocks noGrp="1"/>
-          </p:cNvSpPr>
-          <p:nvPr>
-            <p:ph type="title"/>
-          </p:nvPr>
-        </p:nvSpPr>
-        <p:spPr/>
-        <p:txBody>
-          <a:bodyPr/>
-          <a:lstStyle/>
-          <a:p>
-            <a:r>
-              <a:rPr lang="en-US" dirty="0" smtClean="0"/>
-              <a:t>ANOVA</a:t>
-            </a:r>
-            <a:r>
-              <a:rPr lang="zh-CN" altLang="en-US" dirty="0" smtClean="0"/>
-              <a:t> </a:t>
-            </a:r>
-            <a:r>
-              <a:rPr lang="en-US" altLang="zh-CN" dirty="0" smtClean="0"/>
-              <a:t>example</a:t>
-            </a:r>
-            <a:endParaRPr lang="en-US" dirty="0"/>
-          </a:p>
-        </p:txBody>
-      </p:sp>
-      <p:sp>
-        <p:nvSpPr>
-          <p:cNvPr id="3" name="Content Placeholder 2"/>
-          <p:cNvSpPr>
-            <a:spLocks noGrp="1"/>
-          </p:cNvSpPr>
-          <p:nvPr>
-            <p:ph idx="1"/>
-          </p:nvPr>
-        </p:nvSpPr>
-        <p:spPr/>
-        <p:txBody>
-          <a:bodyPr>
-            <a:normAutofit fontScale="92500" lnSpcReduction="20000"/>
-          </a:bodyPr>
-          <a:lstStyle/>
-          <a:p>
-            <a:r>
-              <a:rPr lang="en-US" dirty="0" smtClean="0"/>
-              <a:t>Ex</a:t>
-            </a:r>
-            <a:r>
-              <a:rPr lang="en-US" dirty="0"/>
-              <a:t>. A drug company tested three formulations of a pain relief medicine </a:t>
-            </a:r>
-            <a:r>
-              <a:rPr lang="en-US" dirty="0" smtClean="0"/>
-              <a:t>for</a:t>
-            </a:r>
-            <a:r>
-              <a:rPr lang="zh-CN" altLang="en-US" dirty="0" smtClean="0"/>
-              <a:t> </a:t>
-            </a:r>
-            <a:r>
-              <a:rPr lang="en-US" dirty="0" smtClean="0"/>
-              <a:t>migraine </a:t>
-            </a:r>
-            <a:r>
-              <a:rPr lang="en-US" dirty="0"/>
-              <a:t>headache sufferers. For the experiment 27 volunteers were </a:t>
-            </a:r>
-            <a:r>
-              <a:rPr lang="en-US" dirty="0" smtClean="0"/>
-              <a:t>selected</a:t>
-            </a:r>
-            <a:r>
-              <a:rPr lang="zh-CN" altLang="en-US" dirty="0" smtClean="0"/>
-              <a:t> </a:t>
-            </a:r>
-            <a:r>
-              <a:rPr lang="en-US" dirty="0" smtClean="0"/>
-              <a:t>and </a:t>
-            </a:r>
-            <a:r>
-              <a:rPr lang="en-US" dirty="0"/>
-              <a:t>9 were randomly assigned to one of three </a:t>
-            </a:r>
-            <a:r>
-              <a:rPr lang="en-US" dirty="0" smtClean="0"/>
-              <a:t>drug</a:t>
-            </a:r>
-            <a:r>
-              <a:rPr lang="zh-CN" altLang="en-US" dirty="0" smtClean="0"/>
-              <a:t> </a:t>
-            </a:r>
-            <a:r>
-              <a:rPr lang="en-US" dirty="0" smtClean="0"/>
-              <a:t>formulations</a:t>
-            </a:r>
-            <a:r>
-              <a:rPr lang="en-US" dirty="0"/>
-              <a:t>. The </a:t>
-            </a:r>
-            <a:r>
-              <a:rPr lang="en-US" dirty="0" smtClean="0"/>
-              <a:t>subjects</a:t>
-            </a:r>
-            <a:r>
-              <a:rPr lang="zh-CN" altLang="en-US" dirty="0" smtClean="0"/>
-              <a:t> </a:t>
-            </a:r>
-            <a:r>
-              <a:rPr lang="en-US" dirty="0" smtClean="0"/>
-              <a:t>were </a:t>
-            </a:r>
-            <a:r>
-              <a:rPr lang="en-US" dirty="0"/>
-              <a:t>instructed to take the drug during their next migraine headache episode </a:t>
-            </a:r>
-            <a:r>
-              <a:rPr lang="en-US" dirty="0" smtClean="0"/>
-              <a:t>and</a:t>
-            </a:r>
-            <a:r>
-              <a:rPr lang="zh-CN" altLang="en-US" dirty="0" smtClean="0"/>
-              <a:t> </a:t>
-            </a:r>
-            <a:r>
-              <a:rPr lang="en-US" dirty="0" smtClean="0"/>
-              <a:t>to </a:t>
-            </a:r>
-            <a:r>
-              <a:rPr lang="en-US" dirty="0"/>
-              <a:t>report their pain on a scale of 1 to 10 (10 being most pain).</a:t>
-            </a:r>
-          </a:p>
-          <a:p>
-            <a:r>
-              <a:rPr lang="en-US" dirty="0" smtClean="0"/>
-              <a:t>Drug </a:t>
-            </a:r>
-            <a:r>
-              <a:rPr lang="en-US" dirty="0"/>
-              <a:t>A 4 5 4 3 2 4 3 4 4</a:t>
-            </a:r>
-          </a:p>
-          <a:p>
-            <a:r>
-              <a:rPr lang="en-US" dirty="0" smtClean="0"/>
-              <a:t>Drug </a:t>
-            </a:r>
-            <a:r>
-              <a:rPr lang="en-US" dirty="0"/>
-              <a:t>B 6 8 4 5 4 6 5 8 6</a:t>
-            </a:r>
-          </a:p>
-          <a:p>
-            <a:r>
-              <a:rPr lang="en-US" dirty="0" smtClean="0"/>
-              <a:t>Drug </a:t>
-            </a:r>
-            <a:r>
-              <a:rPr lang="en-US" dirty="0"/>
-              <a:t>C 6 7 6 6 7 5 6 5 </a:t>
-            </a:r>
-            <a:r>
-              <a:rPr lang="en-US" dirty="0" smtClean="0"/>
-              <a:t>5</a:t>
-            </a:r>
-            <a:endParaRPr lang="en-US" dirty="0"/>
-          </a:p>
-        </p:txBody>
-      </p:sp>
-      <p:sp>
-        <p:nvSpPr>
-          <p:cNvPr id="4" name="Slide Number Placeholder 3"/>
-          <p:cNvSpPr>
-            <a:spLocks noGrp="1"/>
-          </p:cNvSpPr>
-          <p:nvPr>
-            <p:ph type="sldNum" sz="quarter" idx="12"/>
-          </p:nvPr>
-        </p:nvSpPr>
-        <p:spPr/>
-        <p:txBody>
-          <a:bodyPr/>
-          <a:lstStyle/>
-          <a:p>
-            <a:fld id="{71E0F468-36C2-4A31-ABC4-3235B7B5704F}" type="slidenum">
-              <a:rPr lang="en-US" smtClean="0"/>
-              <a:t>27</a:t>
-            </a:fld>
-            <a:endParaRPr lang="en-US"/>
-          </a:p>
-        </p:txBody>
-      </p:sp>
-    </p:spTree>
-    <p:extLst>
-      <p:ext uri="{BB962C8B-B14F-4D97-AF65-F5344CB8AC3E}">
-        <p14:creationId xmlns:p14="http://schemas.microsoft.com/office/powerpoint/2010/main" val="1436087436"/>
-      </p:ext>
-    </p:extLst>
-  </p:cSld>
-  <p:clrMapOvr>
-    <a:masterClrMapping/>
-  </p:clrMapOvr>
-</p:sld>
-</file>
-
-<file path=ppt/slides/slide28.xml><?xml version="1.0" encoding="utf-8"?>
-<p:sld xmlns:a="http://schemas.openxmlformats.org/drawingml/2006/main" xmlns:r="http://schemas.openxmlformats.org/officeDocument/2006/relationships" xmlns:p="http://schemas.openxmlformats.org/presentationml/2006/main">
-  <p:cSld>
-    <p:spTree>
-      <p:nvGrpSpPr>
-        <p:cNvPr id="1" name=""/>
-        <p:cNvGrpSpPr/>
-        <p:nvPr/>
-      </p:nvGrpSpPr>
-      <p:grpSpPr>
-        <a:xfrm>
-          <a:off x="0" y="0"/>
-          <a:ext cx="0" cy="0"/>
-          <a:chOff x="0" y="0"/>
-          <a:chExt cx="0" cy="0"/>
-        </a:xfrm>
-      </p:grpSpPr>
-      <p:sp>
-        <p:nvSpPr>
-          <p:cNvPr id="2" name="Title 1"/>
-          <p:cNvSpPr>
-            <a:spLocks noGrp="1"/>
-          </p:cNvSpPr>
-          <p:nvPr>
-            <p:ph type="title"/>
-          </p:nvPr>
-        </p:nvSpPr>
-        <p:spPr/>
-        <p:txBody>
-          <a:bodyPr/>
-          <a:lstStyle/>
-          <a:p>
-            <a:r>
-              <a:rPr lang="en-US" dirty="0" smtClean="0"/>
-              <a:t>ANOVA</a:t>
-            </a:r>
-            <a:r>
-              <a:rPr lang="en-US" dirty="0" smtClean="0"/>
-              <a:t> in R</a:t>
-            </a:r>
-            <a:endParaRPr lang="en-US" dirty="0"/>
-          </a:p>
-        </p:txBody>
-      </p:sp>
-      <p:sp>
-        <p:nvSpPr>
-          <p:cNvPr id="3" name="Content Placeholder 2"/>
-          <p:cNvSpPr>
-            <a:spLocks noGrp="1"/>
-          </p:cNvSpPr>
-          <p:nvPr>
-            <p:ph idx="1"/>
-          </p:nvPr>
-        </p:nvSpPr>
-        <p:spPr/>
-        <p:txBody>
-          <a:bodyPr>
-            <a:normAutofit fontScale="92500"/>
-          </a:bodyPr>
-          <a:lstStyle/>
-          <a:p>
-            <a:r>
-              <a:rPr lang="mr-IN" dirty="0"/>
-              <a:t>pain = c(4, 5, 4, 3, 2, 4, 3, 4, 4, 6, 8, 4, 5, 4, 6, 5, 8, 6, 6, 7, 6, 6, 7, 5, 6, 5, 5)</a:t>
-            </a:r>
-          </a:p>
-          <a:p>
-            <a:r>
-              <a:rPr lang="mr-IN" dirty="0"/>
-              <a:t>drug = c(rep("A",9), rep("B",9), rep("C",9))</a:t>
-            </a:r>
-          </a:p>
-          <a:p>
-            <a:r>
-              <a:rPr lang="mr-IN" dirty="0"/>
-              <a:t>migraine = data.frame(pain,drug)</a:t>
-            </a:r>
-          </a:p>
-          <a:p>
-            <a:r>
-              <a:rPr lang="mr-IN" dirty="0"/>
-              <a:t>plot(pain ~ drug, data=migraine)</a:t>
-            </a:r>
-          </a:p>
-          <a:p>
-            <a:endParaRPr lang="mr-IN" dirty="0"/>
-          </a:p>
-          <a:p>
-            <a:r>
-              <a:rPr lang="mr-IN" dirty="0"/>
-              <a:t>results = aov(pain ~ drug, data=migraine)</a:t>
-            </a:r>
-          </a:p>
-          <a:p>
-            <a:r>
-              <a:rPr lang="mr-IN" dirty="0"/>
-              <a:t> summary(results)</a:t>
-            </a:r>
-            <a:endParaRPr lang="en-US" dirty="0"/>
-          </a:p>
-        </p:txBody>
-      </p:sp>
-      <p:sp>
-        <p:nvSpPr>
-          <p:cNvPr id="4" name="Slide Number Placeholder 3"/>
-          <p:cNvSpPr>
-            <a:spLocks noGrp="1"/>
-          </p:cNvSpPr>
-          <p:nvPr>
-            <p:ph type="sldNum" sz="quarter" idx="12"/>
-          </p:nvPr>
-        </p:nvSpPr>
-        <p:spPr/>
-        <p:txBody>
-          <a:bodyPr/>
-          <a:lstStyle/>
-          <a:p>
-            <a:fld id="{71E0F468-36C2-4A31-ABC4-3235B7B5704F}" type="slidenum">
-              <a:rPr lang="en-US" smtClean="0"/>
-              <a:t>28</a:t>
-            </a:fld>
-            <a:endParaRPr lang="en-US"/>
-          </a:p>
-        </p:txBody>
-      </p:sp>
-    </p:spTree>
-    <p:extLst>
-      <p:ext uri="{BB962C8B-B14F-4D97-AF65-F5344CB8AC3E}">
-        <p14:creationId xmlns:p14="http://schemas.microsoft.com/office/powerpoint/2010/main" val="223380578"/>
       </p:ext>
     </p:extLst>
   </p:cSld>
@@ -12396,8 +12268,155 @@
               <a:t>ANOVA</a:t>
             </a:r>
             <a:r>
+              <a:rPr lang="zh-CN" altLang="en-US" dirty="0" smtClean="0"/>
+              <a:t> </a:t>
+            </a:r>
+            <a:r>
+              <a:rPr lang="en-US" altLang="zh-CN" dirty="0" smtClean="0"/>
+              <a:t>example</a:t>
+            </a:r>
+            <a:endParaRPr lang="en-US" dirty="0"/>
+          </a:p>
+        </p:txBody>
+      </p:sp>
+      <p:sp>
+        <p:nvSpPr>
+          <p:cNvPr id="3" name="Content Placeholder 2"/>
+          <p:cNvSpPr>
+            <a:spLocks noGrp="1"/>
+          </p:cNvSpPr>
+          <p:nvPr>
+            <p:ph idx="1"/>
+          </p:nvPr>
+        </p:nvSpPr>
+        <p:spPr/>
+        <p:txBody>
+          <a:bodyPr>
+            <a:normAutofit fontScale="92500" lnSpcReduction="20000"/>
+          </a:bodyPr>
+          <a:lstStyle/>
+          <a:p>
+            <a:r>
               <a:rPr lang="en-US" dirty="0" smtClean="0"/>
-              <a:t> in R</a:t>
+              <a:t>Ex</a:t>
+            </a:r>
+            <a:r>
+              <a:rPr lang="en-US" dirty="0"/>
+              <a:t>. A drug company tested three formulations of a pain relief medicine </a:t>
+            </a:r>
+            <a:r>
+              <a:rPr lang="en-US" dirty="0" smtClean="0"/>
+              <a:t>for</a:t>
+            </a:r>
+            <a:r>
+              <a:rPr lang="zh-CN" altLang="en-US" dirty="0" smtClean="0"/>
+              <a:t> </a:t>
+            </a:r>
+            <a:r>
+              <a:rPr lang="en-US" dirty="0" smtClean="0"/>
+              <a:t>migraine </a:t>
+            </a:r>
+            <a:r>
+              <a:rPr lang="en-US" dirty="0"/>
+              <a:t>headache sufferers. For the experiment 27 volunteers were </a:t>
+            </a:r>
+            <a:r>
+              <a:rPr lang="en-US" dirty="0" smtClean="0"/>
+              <a:t>selected</a:t>
+            </a:r>
+            <a:r>
+              <a:rPr lang="zh-CN" altLang="en-US" dirty="0" smtClean="0"/>
+              <a:t> </a:t>
+            </a:r>
+            <a:r>
+              <a:rPr lang="en-US" dirty="0" smtClean="0"/>
+              <a:t>and </a:t>
+            </a:r>
+            <a:r>
+              <a:rPr lang="en-US" dirty="0"/>
+              <a:t>9 were randomly assigned to one of three </a:t>
+            </a:r>
+            <a:r>
+              <a:rPr lang="en-US" dirty="0" smtClean="0"/>
+              <a:t>drug</a:t>
+            </a:r>
+            <a:r>
+              <a:rPr lang="zh-CN" altLang="en-US" dirty="0" smtClean="0"/>
+              <a:t> </a:t>
+            </a:r>
+            <a:r>
+              <a:rPr lang="en-US" dirty="0" smtClean="0"/>
+              <a:t>formulations</a:t>
+            </a:r>
+            <a:r>
+              <a:rPr lang="en-US" dirty="0"/>
+              <a:t>. The </a:t>
+            </a:r>
+            <a:r>
+              <a:rPr lang="en-US" dirty="0" smtClean="0"/>
+              <a:t>subjects</a:t>
+            </a:r>
+            <a:r>
+              <a:rPr lang="zh-CN" altLang="en-US" dirty="0" smtClean="0"/>
+              <a:t> </a:t>
+            </a:r>
+            <a:r>
+              <a:rPr lang="en-US" dirty="0" smtClean="0"/>
+              <a:t>were </a:t>
+            </a:r>
+            <a:r>
+              <a:rPr lang="en-US" dirty="0"/>
+              <a:t>instructed to take the drug during their next migraine headache episode </a:t>
+            </a:r>
+            <a:r>
+              <a:rPr lang="en-US" dirty="0" smtClean="0"/>
+              <a:t>and</a:t>
+            </a:r>
+            <a:r>
+              <a:rPr lang="zh-CN" altLang="en-US" dirty="0" smtClean="0"/>
+              <a:t> </a:t>
+            </a:r>
+            <a:r>
+              <a:rPr lang="en-US" dirty="0" smtClean="0"/>
+              <a:t>to </a:t>
+            </a:r>
+            <a:r>
+              <a:rPr lang="en-US" dirty="0"/>
+              <a:t>report their pain on a scale of 1 to 10 (10 being most pain).</a:t>
+            </a:r>
+          </a:p>
+          <a:p>
+            <a:r>
+              <a:rPr lang="en-US" dirty="0" smtClean="0"/>
+              <a:t>Drug </a:t>
+            </a:r>
+            <a:r>
+              <a:rPr lang="en-US" dirty="0"/>
+              <a:t>A 4 5 4 3 2 4 3 4 4</a:t>
+            </a:r>
+          </a:p>
+          <a:p>
+            <a:r>
+              <a:rPr lang="en-US" dirty="0" smtClean="0"/>
+              <a:t>Drug </a:t>
+            </a:r>
+            <a:r>
+              <a:rPr lang="en-US" dirty="0"/>
+              <a:t>B 6 8 4 5 4 6 5 8 6</a:t>
+            </a:r>
+          </a:p>
+          <a:p>
+            <a:r>
+              <a:rPr lang="en-US" dirty="0" smtClean="0"/>
+              <a:t>Drug </a:t>
+            </a:r>
+            <a:r>
+              <a:rPr lang="en-US" dirty="0"/>
+              <a:t>C 6 7 6 6 7 5 6 5 </a:t>
+            </a:r>
+            <a:r>
+              <a:rPr lang="en-US" dirty="0" smtClean="0"/>
+              <a:t>5</a:t>
             </a:r>
             <a:endParaRPr lang="en-US" dirty="0"/>
           </a:p>
@@ -12421,6 +12440,347 @@
             <a:fld id="{71E0F468-36C2-4A31-ABC4-3235B7B5704F}" type="slidenum">
               <a:rPr lang="en-US" smtClean="0"/>
               <a:t>29</a:t>
+            </a:fld>
+            <a:endParaRPr lang="en-US"/>
+          </a:p>
+        </p:txBody>
+      </p:sp>
+    </p:spTree>
+    <p:extLst>
+      <p:ext uri="{BB962C8B-B14F-4D97-AF65-F5344CB8AC3E}">
+        <p14:creationId xmlns:p14="http://schemas.microsoft.com/office/powerpoint/2010/main" val="1436087436"/>
+      </p:ext>
+    </p:extLst>
+  </p:cSld>
+  <p:clrMapOvr>
+    <a:masterClrMapping/>
+  </p:clrMapOvr>
+</p:sld>
+</file>
+
+<file path=ppt/slides/slide3.xml><?xml version="1.0" encoding="utf-8"?>
+<p:sld xmlns:a="http://schemas.openxmlformats.org/drawingml/2006/main" xmlns:r="http://schemas.openxmlformats.org/officeDocument/2006/relationships" xmlns:p="http://schemas.openxmlformats.org/presentationml/2006/main">
+  <p:cSld>
+    <p:spTree>
+      <p:nvGrpSpPr>
+        <p:cNvPr id="1" name=""/>
+        <p:cNvGrpSpPr/>
+        <p:nvPr/>
+      </p:nvGrpSpPr>
+      <p:grpSpPr>
+        <a:xfrm>
+          <a:off x="0" y="0"/>
+          <a:ext cx="0" cy="0"/>
+          <a:chOff x="0" y="0"/>
+          <a:chExt cx="0" cy="0"/>
+        </a:xfrm>
+      </p:grpSpPr>
+      <p:sp>
+        <p:nvSpPr>
+          <p:cNvPr id="2" name="Title 1"/>
+          <p:cNvSpPr>
+            <a:spLocks noGrp="1"/>
+          </p:cNvSpPr>
+          <p:nvPr>
+            <p:ph type="title"/>
+          </p:nvPr>
+        </p:nvSpPr>
+        <p:spPr/>
+        <p:txBody>
+          <a:bodyPr>
+            <a:noAutofit/>
+          </a:bodyPr>
+          <a:lstStyle/>
+          <a:p>
+            <a:r>
+              <a:rPr lang="en-US" b="1" dirty="0">
+                <a:solidFill>
+                  <a:srgbClr val="000099"/>
+                </a:solidFill>
+                <a:latin typeface="Palatino Linotype" pitchFamily="18" charset="0"/>
+              </a:rPr>
+              <a:t>Examples of research question</a:t>
+            </a:r>
+          </a:p>
+        </p:txBody>
+      </p:sp>
+      <p:sp>
+        <p:nvSpPr>
+          <p:cNvPr id="3" name="Content Placeholder 2"/>
+          <p:cNvSpPr>
+            <a:spLocks noGrp="1"/>
+          </p:cNvSpPr>
+          <p:nvPr>
+            <p:ph idx="1"/>
+          </p:nvPr>
+        </p:nvSpPr>
+        <p:spPr/>
+        <p:txBody>
+          <a:bodyPr/>
+          <a:lstStyle/>
+          <a:p>
+            <a:r>
+              <a:rPr lang="en-US" sz="2400" dirty="0">
+                <a:latin typeface="Palatino Linotype" pitchFamily="18" charset="0"/>
+              </a:rPr>
+              <a:t>How scores on an aptitude test vary for students in different types of schooling environments---home schooling, public schooling, and private schooling?</a:t>
+            </a:r>
+          </a:p>
+          <a:p>
+            <a:r>
+              <a:rPr lang="en-US" sz="2400" dirty="0">
+                <a:latin typeface="Palatino Linotype" pitchFamily="18" charset="0"/>
+              </a:rPr>
+              <a:t>A market researcher wants to determine if there is a significant difference between the response rates to five different marketing campaigns.</a:t>
+            </a:r>
+            <a:endParaRPr lang="en-US" dirty="0">
+              <a:latin typeface="Palatino Linotype" pitchFamily="18" charset="0"/>
+            </a:endParaRPr>
+          </a:p>
+          <a:p>
+            <a:r>
+              <a:rPr lang="en-US" sz="2400" dirty="0">
+                <a:solidFill>
+                  <a:srgbClr val="FF0000"/>
+                </a:solidFill>
+                <a:latin typeface="Palatino Linotype" pitchFamily="18" charset="0"/>
+              </a:rPr>
+              <a:t>In sum, ANOVA deals with three or more samples</a:t>
+            </a:r>
+            <a:endParaRPr lang="en-US" sz="2400" dirty="0">
+              <a:latin typeface="Palatino Linotype" pitchFamily="18" charset="0"/>
+            </a:endParaRPr>
+          </a:p>
+        </p:txBody>
+      </p:sp>
+      <p:sp>
+        <p:nvSpPr>
+          <p:cNvPr id="4" name="Slide Number Placeholder 3"/>
+          <p:cNvSpPr>
+            <a:spLocks noGrp="1"/>
+          </p:cNvSpPr>
+          <p:nvPr>
+            <p:ph type="sldNum" sz="quarter" idx="12"/>
+          </p:nvPr>
+        </p:nvSpPr>
+        <p:spPr/>
+        <p:txBody>
+          <a:bodyPr/>
+          <a:lstStyle/>
+          <a:p>
+            <a:fld id="{71E0F468-36C2-4A31-ABC4-3235B7B5704F}" type="slidenum">
+              <a:rPr lang="en-US" smtClean="0"/>
+              <a:t>3</a:t>
+            </a:fld>
+            <a:endParaRPr lang="en-US"/>
+          </a:p>
+        </p:txBody>
+      </p:sp>
+    </p:spTree>
+    <p:extLst>
+      <p:ext uri="{BB962C8B-B14F-4D97-AF65-F5344CB8AC3E}">
+        <p14:creationId xmlns:p14="http://schemas.microsoft.com/office/powerpoint/2010/main" val="2716873837"/>
+      </p:ext>
+    </p:extLst>
+  </p:cSld>
+  <p:clrMapOvr>
+    <a:masterClrMapping/>
+  </p:clrMapOvr>
+</p:sld>
+</file>
+
+<file path=ppt/slides/slide30.xml><?xml version="1.0" encoding="utf-8"?>
+<p:sld xmlns:a="http://schemas.openxmlformats.org/drawingml/2006/main" xmlns:r="http://schemas.openxmlformats.org/officeDocument/2006/relationships" xmlns:p="http://schemas.openxmlformats.org/presentationml/2006/main">
+  <p:cSld>
+    <p:spTree>
+      <p:nvGrpSpPr>
+        <p:cNvPr id="1" name=""/>
+        <p:cNvGrpSpPr/>
+        <p:nvPr/>
+      </p:nvGrpSpPr>
+      <p:grpSpPr>
+        <a:xfrm>
+          <a:off x="0" y="0"/>
+          <a:ext cx="0" cy="0"/>
+          <a:chOff x="0" y="0"/>
+          <a:chExt cx="0" cy="0"/>
+        </a:xfrm>
+      </p:grpSpPr>
+      <p:sp>
+        <p:nvSpPr>
+          <p:cNvPr id="2" name="Title 1"/>
+          <p:cNvSpPr>
+            <a:spLocks noGrp="1"/>
+          </p:cNvSpPr>
+          <p:nvPr>
+            <p:ph type="title"/>
+          </p:nvPr>
+        </p:nvSpPr>
+        <p:spPr/>
+        <p:txBody>
+          <a:bodyPr/>
+          <a:lstStyle/>
+          <a:p>
+            <a:r>
+              <a:rPr lang="en-US" dirty="0" smtClean="0"/>
+              <a:t>ANOVA in R</a:t>
+            </a:r>
+            <a:endParaRPr lang="en-US" dirty="0"/>
+          </a:p>
+        </p:txBody>
+      </p:sp>
+      <p:sp>
+        <p:nvSpPr>
+          <p:cNvPr id="3" name="Content Placeholder 2"/>
+          <p:cNvSpPr>
+            <a:spLocks noGrp="1"/>
+          </p:cNvSpPr>
+          <p:nvPr>
+            <p:ph idx="1"/>
+          </p:nvPr>
+        </p:nvSpPr>
+        <p:spPr/>
+        <p:txBody>
+          <a:bodyPr>
+            <a:normAutofit fontScale="92500"/>
+          </a:bodyPr>
+          <a:lstStyle/>
+          <a:p>
+            <a:r>
+              <a:rPr lang="mr-IN" dirty="0"/>
+              <a:t>pain = c(4, 5, 4, 3, 2, 4, 3, 4, 4, 6, 8, 4, 5, 4, 6, 5, 8, 6, 6, 7, 6, 6, 7, 5, 6, 5, 5)</a:t>
+            </a:r>
+          </a:p>
+          <a:p>
+            <a:r>
+              <a:rPr lang="mr-IN" dirty="0"/>
+              <a:t>drug = c(rep("A",9), rep("B",9), rep("C",9))</a:t>
+            </a:r>
+          </a:p>
+          <a:p>
+            <a:r>
+              <a:rPr lang="mr-IN" dirty="0"/>
+              <a:t>migraine = data.frame(pain,drug)</a:t>
+            </a:r>
+          </a:p>
+          <a:p>
+            <a:r>
+              <a:rPr lang="mr-IN" dirty="0"/>
+              <a:t>plot(pain ~ drug, data=migraine)</a:t>
+            </a:r>
+          </a:p>
+          <a:p>
+            <a:endParaRPr lang="mr-IN" dirty="0"/>
+          </a:p>
+          <a:p>
+            <a:r>
+              <a:rPr lang="mr-IN" dirty="0"/>
+              <a:t>results = aov(pain ~ drug, data=migraine)</a:t>
+            </a:r>
+          </a:p>
+          <a:p>
+            <a:r>
+              <a:rPr lang="mr-IN" dirty="0"/>
+              <a:t> summary(results)</a:t>
+            </a:r>
+            <a:endParaRPr lang="en-US" dirty="0"/>
+          </a:p>
+        </p:txBody>
+      </p:sp>
+      <p:sp>
+        <p:nvSpPr>
+          <p:cNvPr id="4" name="Slide Number Placeholder 3"/>
+          <p:cNvSpPr>
+            <a:spLocks noGrp="1"/>
+          </p:cNvSpPr>
+          <p:nvPr>
+            <p:ph type="sldNum" sz="quarter" idx="12"/>
+          </p:nvPr>
+        </p:nvSpPr>
+        <p:spPr/>
+        <p:txBody>
+          <a:bodyPr/>
+          <a:lstStyle/>
+          <a:p>
+            <a:fld id="{71E0F468-36C2-4A31-ABC4-3235B7B5704F}" type="slidenum">
+              <a:rPr lang="en-US" smtClean="0"/>
+              <a:t>30</a:t>
+            </a:fld>
+            <a:endParaRPr lang="en-US"/>
+          </a:p>
+        </p:txBody>
+      </p:sp>
+    </p:spTree>
+    <p:extLst>
+      <p:ext uri="{BB962C8B-B14F-4D97-AF65-F5344CB8AC3E}">
+        <p14:creationId xmlns:p14="http://schemas.microsoft.com/office/powerpoint/2010/main" val="223380578"/>
+      </p:ext>
+    </p:extLst>
+  </p:cSld>
+  <p:clrMapOvr>
+    <a:masterClrMapping/>
+  </p:clrMapOvr>
+</p:sld>
+</file>
+
+<file path=ppt/slides/slide31.xml><?xml version="1.0" encoding="utf-8"?>
+<p:sld xmlns:a="http://schemas.openxmlformats.org/drawingml/2006/main" xmlns:r="http://schemas.openxmlformats.org/officeDocument/2006/relationships" xmlns:p="http://schemas.openxmlformats.org/presentationml/2006/main">
+  <p:cSld>
+    <p:spTree>
+      <p:nvGrpSpPr>
+        <p:cNvPr id="1" name=""/>
+        <p:cNvGrpSpPr/>
+        <p:nvPr/>
+      </p:nvGrpSpPr>
+      <p:grpSpPr>
+        <a:xfrm>
+          <a:off x="0" y="0"/>
+          <a:ext cx="0" cy="0"/>
+          <a:chOff x="0" y="0"/>
+          <a:chExt cx="0" cy="0"/>
+        </a:xfrm>
+      </p:grpSpPr>
+      <p:sp>
+        <p:nvSpPr>
+          <p:cNvPr id="2" name="Title 1"/>
+          <p:cNvSpPr>
+            <a:spLocks noGrp="1"/>
+          </p:cNvSpPr>
+          <p:nvPr>
+            <p:ph type="title"/>
+          </p:nvPr>
+        </p:nvSpPr>
+        <p:spPr/>
+        <p:txBody>
+          <a:bodyPr/>
+          <a:lstStyle/>
+          <a:p>
+            <a:r>
+              <a:rPr lang="en-US" dirty="0" smtClean="0"/>
+              <a:t>ANOVA in R</a:t>
+            </a:r>
+            <a:endParaRPr lang="en-US" dirty="0"/>
+          </a:p>
+        </p:txBody>
+      </p:sp>
+      <p:sp>
+        <p:nvSpPr>
+          <p:cNvPr id="4" name="Slide Number Placeholder 3"/>
+          <p:cNvSpPr>
+            <a:spLocks noGrp="1"/>
+          </p:cNvSpPr>
+          <p:nvPr>
+            <p:ph type="sldNum" sz="quarter" idx="12"/>
+          </p:nvPr>
+        </p:nvSpPr>
+        <p:spPr/>
+        <p:txBody>
+          <a:bodyPr/>
+          <a:lstStyle/>
+          <a:p>
+            <a:fld id="{71E0F468-36C2-4A31-ABC4-3235B7B5704F}" type="slidenum">
+              <a:rPr lang="en-US" smtClean="0"/>
+              <a:t>31</a:t>
             </a:fld>
             <a:endParaRPr lang="en-US"/>
           </a:p>
@@ -12469,7 +12829,7 @@
 </p:sld>
 </file>
 
-<file path=ppt/slides/slide3.xml><?xml version="1.0" encoding="utf-8"?>
+<file path=ppt/slides/slide32.xml><?xml version="1.0" encoding="utf-8"?>
 <p:sld xmlns:a="http://schemas.openxmlformats.org/drawingml/2006/main" xmlns:r="http://schemas.openxmlformats.org/officeDocument/2006/relationships" xmlns:p="http://schemas.openxmlformats.org/presentationml/2006/main">
   <p:cSld>
     <p:spTree>
@@ -12498,69 +12858,13 @@
         </p:nvSpPr>
         <p:spPr/>
         <p:txBody>
-          <a:bodyPr>
-            <a:noAutofit/>
-          </a:bodyPr>
-          <a:lstStyle/>
-          <a:p>
-            <a:r>
-              <a:rPr lang="en-US" b="1" dirty="0">
-                <a:solidFill>
-                  <a:srgbClr val="000099"/>
-                </a:solidFill>
-                <a:latin typeface="Palatino Linotype" pitchFamily="18" charset="0"/>
-              </a:rPr>
-              <a:t>Examples of research question</a:t>
-            </a:r>
-          </a:p>
-        </p:txBody>
-      </p:sp>
-      <p:sp>
-        <p:nvSpPr>
-          <p:cNvPr id="3" name="Content Placeholder 2"/>
-          <p:cNvSpPr>
-            <a:spLocks noGrp="1"/>
-          </p:cNvSpPr>
-          <p:nvPr>
-            <p:ph idx="1"/>
-          </p:nvPr>
-        </p:nvSpPr>
-        <p:spPr/>
-        <p:txBody>
           <a:bodyPr/>
           <a:lstStyle/>
           <a:p>
             <a:r>
-              <a:rPr lang="en-US" sz="2400" dirty="0">
-                <a:latin typeface="Palatino Linotype" pitchFamily="18" charset="0"/>
-              </a:rPr>
-              <a:t>How scores on an aptitude test vary for students in different types of schooling environments---home schooling, public schooling, and private schooling?</a:t>
-            </a:r>
-          </a:p>
-          <a:p>
-            <a:r>
-              <a:rPr lang="en-US" sz="2400" dirty="0">
-                <a:latin typeface="Palatino Linotype" pitchFamily="18" charset="0"/>
-              </a:rPr>
-              <a:t>A market researcher wants to determine if there is a significant difference between the response rates to five different marketing campaigns.</a:t>
-            </a:r>
-            <a:endParaRPr lang="en-US" dirty="0">
-              <a:latin typeface="Palatino Linotype" pitchFamily="18" charset="0"/>
-            </a:endParaRPr>
-          </a:p>
-          <a:p>
-            <a:r>
-              <a:rPr lang="en-US" sz="2400" dirty="0">
-                <a:solidFill>
-                  <a:srgbClr val="FF0000"/>
-                </a:solidFill>
-                <a:latin typeface="Palatino Linotype" pitchFamily="18" charset="0"/>
-              </a:rPr>
-              <a:t>In sum, ANOVA deals with three or more samples</a:t>
-            </a:r>
-            <a:endParaRPr lang="en-US" sz="2400" dirty="0">
-              <a:latin typeface="Palatino Linotype" pitchFamily="18" charset="0"/>
-            </a:endParaRPr>
+              <a:rPr lang="en-US" dirty="0"/>
+              <a:t>ANOVA in R</a:t>
+            </a:r>
           </a:p>
         </p:txBody>
       </p:sp>
@@ -12581,82 +12885,7 @@
           <a:p>
             <a:fld id="{71E0F468-36C2-4A31-ABC4-3235B7B5704F}" type="slidenum">
               <a:rPr lang="en-US" smtClean="0"/>
-              <a:t>3</a:t>
-            </a:fld>
-            <a:endParaRPr lang="en-US"/>
-          </a:p>
-        </p:txBody>
-      </p:sp>
-    </p:spTree>
-    <p:extLst>
-      <p:ext uri="{BB962C8B-B14F-4D97-AF65-F5344CB8AC3E}">
-        <p14:creationId xmlns:p14="http://schemas.microsoft.com/office/powerpoint/2010/main" val="2716873837"/>
-      </p:ext>
-    </p:extLst>
-  </p:cSld>
-  <p:clrMapOvr>
-    <a:masterClrMapping/>
-  </p:clrMapOvr>
-</p:sld>
-</file>
-
-<file path=ppt/slides/slide30.xml><?xml version="1.0" encoding="utf-8"?>
-<p:sld xmlns:a="http://schemas.openxmlformats.org/drawingml/2006/main" xmlns:r="http://schemas.openxmlformats.org/officeDocument/2006/relationships" xmlns:p="http://schemas.openxmlformats.org/presentationml/2006/main">
-  <p:cSld>
-    <p:spTree>
-      <p:nvGrpSpPr>
-        <p:cNvPr id="1" name=""/>
-        <p:cNvGrpSpPr/>
-        <p:nvPr/>
-      </p:nvGrpSpPr>
-      <p:grpSpPr>
-        <a:xfrm>
-          <a:off x="0" y="0"/>
-          <a:ext cx="0" cy="0"/>
-          <a:chOff x="0" y="0"/>
-          <a:chExt cx="0" cy="0"/>
-        </a:xfrm>
-      </p:grpSpPr>
-      <p:sp>
-        <p:nvSpPr>
-          <p:cNvPr id="2" name="Title 1"/>
-          <p:cNvSpPr>
-            <a:spLocks noGrp="1"/>
-          </p:cNvSpPr>
-          <p:nvPr>
-            <p:ph type="title"/>
-          </p:nvPr>
-        </p:nvSpPr>
-        <p:spPr/>
-        <p:txBody>
-          <a:bodyPr/>
-          <a:lstStyle/>
-          <a:p>
-            <a:r>
-              <a:rPr lang="en-US" dirty="0"/>
-              <a:t>ANOVA in R</a:t>
-            </a:r>
-          </a:p>
-        </p:txBody>
-      </p:sp>
-      <p:sp>
-        <p:nvSpPr>
-          <p:cNvPr id="4" name="Slide Number Placeholder 3"/>
-          <p:cNvSpPr>
-            <a:spLocks noGrp="1"/>
-          </p:cNvSpPr>
-          <p:nvPr>
-            <p:ph type="sldNum" sz="quarter" idx="12"/>
-          </p:nvPr>
-        </p:nvSpPr>
-        <p:spPr/>
-        <p:txBody>
-          <a:bodyPr/>
-          <a:lstStyle/>
-          <a:p>
-            <a:fld id="{71E0F468-36C2-4A31-ABC4-3235B7B5704F}" type="slidenum">
-              <a:rPr lang="en-US" smtClean="0"/>
-              <a:t>30</a:t>
+              <a:t>32</a:t>
             </a:fld>
             <a:endParaRPr lang="en-US"/>
           </a:p>
@@ -12705,7 +12934,7 @@
 </p:sld>
 </file>
 
-<file path=ppt/slides/slide31.xml><?xml version="1.0" encoding="utf-8"?>
+<file path=ppt/slides/slide33.xml><?xml version="1.0" encoding="utf-8"?>
 <p:sld xmlns:a="http://schemas.openxmlformats.org/drawingml/2006/main" xmlns:r="http://schemas.openxmlformats.org/officeDocument/2006/relationships" xmlns:p="http://schemas.openxmlformats.org/presentationml/2006/main">
   <p:cSld>
     <p:spTree>
@@ -12739,11 +12968,7 @@
           <a:p>
             <a:r>
               <a:rPr lang="en-US" dirty="0" smtClean="0"/>
-              <a:t>ANOVA</a:t>
-            </a:r>
-            <a:r>
-              <a:rPr lang="en-US" dirty="0" smtClean="0"/>
-              <a:t> in R: pairwise comparison</a:t>
+              <a:t>ANOVA in R: pairwise comparison</a:t>
             </a:r>
             <a:endParaRPr lang="en-US" dirty="0"/>
           </a:p>
@@ -12840,7 +13065,7 @@
           <a:p>
             <a:fld id="{71E0F468-36C2-4A31-ABC4-3235B7B5704F}" type="slidenum">
               <a:rPr lang="en-US" smtClean="0"/>
-              <a:t>31</a:t>
+              <a:t>33</a:t>
             </a:fld>
             <a:endParaRPr lang="en-US"/>
           </a:p>
@@ -12859,7 +13084,7 @@
 </p:sld>
 </file>
 
-<file path=ppt/slides/slide32.xml><?xml version="1.0" encoding="utf-8"?>
+<file path=ppt/slides/slide34.xml><?xml version="1.0" encoding="utf-8"?>
 <p:sld xmlns:a="http://schemas.openxmlformats.org/drawingml/2006/main" xmlns:r="http://schemas.openxmlformats.org/officeDocument/2006/relationships" xmlns:p="http://schemas.openxmlformats.org/presentationml/2006/main">
   <p:cSld>
     <p:spTree>
@@ -12893,11 +13118,7 @@
           <a:p>
             <a:r>
               <a:rPr lang="en-US" dirty="0" smtClean="0"/>
-              <a:t>ANOVA</a:t>
-            </a:r>
-            <a:r>
-              <a:rPr lang="en-US" dirty="0" smtClean="0"/>
-              <a:t> in R</a:t>
+              <a:t>ANOVA in R</a:t>
             </a:r>
             <a:endParaRPr lang="en-US" dirty="0"/>
           </a:p>
@@ -12920,7 +13141,7 @@
           <a:p>
             <a:fld id="{71E0F468-36C2-4A31-ABC4-3235B7B5704F}" type="slidenum">
               <a:rPr lang="en-US" smtClean="0"/>
-              <a:t>32</a:t>
+              <a:t>34</a:t>
             </a:fld>
             <a:endParaRPr lang="en-US"/>
           </a:p>
@@ -12969,7 +13190,7 @@
 </p:sld>
 </file>
 
-<file path=ppt/slides/slide33.xml><?xml version="1.0" encoding="utf-8"?>
+<file path=ppt/slides/slide35.xml><?xml version="1.0" encoding="utf-8"?>
 <p:sld xmlns:a="http://schemas.openxmlformats.org/drawingml/2006/main" xmlns:r="http://schemas.openxmlformats.org/officeDocument/2006/relationships" xmlns:p="http://schemas.openxmlformats.org/presentationml/2006/main">
   <p:cSld>
     <p:spTree>
@@ -13003,11 +13224,7 @@
           <a:p>
             <a:r>
               <a:rPr lang="en-US" dirty="0" smtClean="0"/>
-              <a:t>ANOVA</a:t>
-            </a:r>
-            <a:r>
-              <a:rPr lang="en-US" dirty="0" smtClean="0"/>
-              <a:t> in SPSS</a:t>
+              <a:t>ANOVA in SPSS</a:t>
             </a:r>
             <a:endParaRPr lang="en-US" dirty="0"/>
           </a:p>
@@ -13030,7 +13247,7 @@
           <a:p>
             <a:fld id="{71E0F468-36C2-4A31-ABC4-3235B7B5704F}" type="slidenum">
               <a:rPr lang="en-US" smtClean="0"/>
-              <a:t>33</a:t>
+              <a:t>35</a:t>
             </a:fld>
             <a:endParaRPr lang="en-US"/>
           </a:p>
@@ -13079,7 +13296,7 @@
 </p:sld>
 </file>
 
-<file path=ppt/slides/slide34.xml><?xml version="1.0" encoding="utf-8"?>
+<file path=ppt/slides/slide36.xml><?xml version="1.0" encoding="utf-8"?>
 <p:sld xmlns:a="http://schemas.openxmlformats.org/drawingml/2006/main" xmlns:r="http://schemas.openxmlformats.org/officeDocument/2006/relationships" xmlns:p="http://schemas.openxmlformats.org/presentationml/2006/main">
   <p:cSld>
     <p:spTree>
@@ -13113,11 +13330,7 @@
           <a:p>
             <a:r>
               <a:rPr lang="en-US" dirty="0" smtClean="0"/>
-              <a:t>ANOVA</a:t>
-            </a:r>
-            <a:r>
-              <a:rPr lang="en-US" dirty="0" smtClean="0"/>
-              <a:t> in SPSS</a:t>
+              <a:t>ANOVA in SPSS</a:t>
             </a:r>
             <a:endParaRPr lang="en-US" dirty="0"/>
           </a:p>
@@ -13140,7 +13353,7 @@
           <a:p>
             <a:fld id="{71E0F468-36C2-4A31-ABC4-3235B7B5704F}" type="slidenum">
               <a:rPr lang="en-US" smtClean="0"/>
-              <a:t>34</a:t>
+              <a:t>36</a:t>
             </a:fld>
             <a:endParaRPr lang="en-US"/>
           </a:p>
@@ -13189,7 +13402,7 @@
 </p:sld>
 </file>
 
-<file path=ppt/slides/slide35.xml><?xml version="1.0" encoding="utf-8"?>
+<file path=ppt/slides/slide37.xml><?xml version="1.0" encoding="utf-8"?>
 <p:sld xmlns:a="http://schemas.openxmlformats.org/drawingml/2006/main" xmlns:r="http://schemas.openxmlformats.org/officeDocument/2006/relationships" xmlns:p="http://schemas.openxmlformats.org/presentationml/2006/main">
   <p:cSld>
     <p:spTree>
@@ -13223,11 +13436,7 @@
           <a:p>
             <a:r>
               <a:rPr lang="en-US" dirty="0" smtClean="0"/>
-              <a:t>ANOVA</a:t>
-            </a:r>
-            <a:r>
-              <a:rPr lang="en-US" dirty="0" smtClean="0"/>
-              <a:t> in SPSS</a:t>
+              <a:t>ANOVA in SPSS</a:t>
             </a:r>
             <a:endParaRPr lang="en-US" dirty="0"/>
           </a:p>
@@ -13250,7 +13459,7 @@
           <a:p>
             <a:fld id="{71E0F468-36C2-4A31-ABC4-3235B7B5704F}" type="slidenum">
               <a:rPr lang="en-US" smtClean="0"/>
-              <a:t>35</a:t>
+              <a:t>37</a:t>
             </a:fld>
             <a:endParaRPr lang="en-US"/>
           </a:p>
@@ -13299,7 +13508,7 @@
 </p:sld>
 </file>
 
-<file path=ppt/slides/slide36.xml><?xml version="1.0" encoding="utf-8"?>
+<file path=ppt/slides/slide38.xml><?xml version="1.0" encoding="utf-8"?>
 <p:sld xmlns:a="http://schemas.openxmlformats.org/drawingml/2006/main" xmlns:r="http://schemas.openxmlformats.org/officeDocument/2006/relationships" xmlns:p="http://schemas.openxmlformats.org/presentationml/2006/main">
   <p:cSld>
     <p:spTree>
@@ -13333,11 +13542,7 @@
           <a:p>
             <a:r>
               <a:rPr lang="en-US" dirty="0" smtClean="0"/>
-              <a:t>ANOVA</a:t>
-            </a:r>
-            <a:r>
-              <a:rPr lang="en-US" dirty="0" smtClean="0"/>
-              <a:t> in SPSS</a:t>
+              <a:t>ANOVA in SPSS</a:t>
             </a:r>
             <a:endParaRPr lang="en-US" dirty="0"/>
           </a:p>
@@ -13360,7 +13565,7 @@
           <a:p>
             <a:fld id="{71E0F468-36C2-4A31-ABC4-3235B7B5704F}" type="slidenum">
               <a:rPr lang="en-US" smtClean="0"/>
-              <a:t>36</a:t>
+              <a:t>38</a:t>
             </a:fld>
             <a:endParaRPr lang="en-US"/>
           </a:p>
@@ -13409,6 +13614,116 @@
 </p:sld>
 </file>
 
+<file path=ppt/slides/slide39.xml><?xml version="1.0" encoding="utf-8"?>
+<p:sld xmlns:a="http://schemas.openxmlformats.org/drawingml/2006/main" xmlns:r="http://schemas.openxmlformats.org/officeDocument/2006/relationships" xmlns:p="http://schemas.openxmlformats.org/presentationml/2006/main">
+  <p:cSld>
+    <p:spTree>
+      <p:nvGrpSpPr>
+        <p:cNvPr id="1" name=""/>
+        <p:cNvGrpSpPr/>
+        <p:nvPr/>
+      </p:nvGrpSpPr>
+      <p:grpSpPr>
+        <a:xfrm>
+          <a:off x="0" y="0"/>
+          <a:ext cx="0" cy="0"/>
+          <a:chOff x="0" y="0"/>
+          <a:chExt cx="0" cy="0"/>
+        </a:xfrm>
+      </p:grpSpPr>
+      <p:sp>
+        <p:nvSpPr>
+          <p:cNvPr id="2" name="Title 1"/>
+          <p:cNvSpPr>
+            <a:spLocks noGrp="1"/>
+          </p:cNvSpPr>
+          <p:nvPr>
+            <p:ph type="title"/>
+          </p:nvPr>
+        </p:nvSpPr>
+        <p:spPr/>
+        <p:txBody>
+          <a:bodyPr/>
+          <a:lstStyle/>
+          <a:p>
+            <a:r>
+              <a:rPr lang="en-US" dirty="0" smtClean="0"/>
+              <a:t>F</a:t>
+            </a:r>
+            <a:r>
+              <a:rPr lang="en-US" dirty="0" smtClean="0"/>
+              <a:t>- ANOVA Cheat sheet </a:t>
+            </a:r>
+            <a:endParaRPr lang="en-US" dirty="0"/>
+          </a:p>
+        </p:txBody>
+      </p:sp>
+      <p:sp>
+        <p:nvSpPr>
+          <p:cNvPr id="4" name="Slide Number Placeholder 3"/>
+          <p:cNvSpPr>
+            <a:spLocks noGrp="1"/>
+          </p:cNvSpPr>
+          <p:nvPr>
+            <p:ph type="sldNum" sz="quarter" idx="12"/>
+          </p:nvPr>
+        </p:nvSpPr>
+        <p:spPr/>
+        <p:txBody>
+          <a:bodyPr/>
+          <a:lstStyle/>
+          <a:p>
+            <a:fld id="{71E0F468-36C2-4A31-ABC4-3235B7B5704F}" type="slidenum">
+              <a:rPr lang="en-US" smtClean="0"/>
+              <a:t>39</a:t>
+            </a:fld>
+            <a:endParaRPr lang="en-US"/>
+          </a:p>
+        </p:txBody>
+      </p:sp>
+      <p:pic>
+        <p:nvPicPr>
+          <p:cNvPr id="5" name="Picture 4" descr="Screen Shot 2018-04-17 at 9.43.35 AM.png"/>
+          <p:cNvPicPr>
+            <a:picLocks noChangeAspect="1"/>
+          </p:cNvPicPr>
+          <p:nvPr/>
+        </p:nvPicPr>
+        <p:blipFill>
+          <a:blip r:embed="rId2">
+            <a:extLst>
+              <a:ext uri="{28A0092B-C50C-407E-A947-70E740481C1C}">
+                <a14:useLocalDpi xmlns:a14="http://schemas.microsoft.com/office/drawing/2010/main" val="0"/>
+              </a:ext>
+            </a:extLst>
+          </a:blip>
+          <a:stretch>
+            <a:fillRect/>
+          </a:stretch>
+        </p:blipFill>
+        <p:spPr>
+          <a:xfrm>
+            <a:off x="0" y="0"/>
+            <a:ext cx="9144000" cy="6847083"/>
+          </a:xfrm>
+          <a:prstGeom prst="rect">
+            <a:avLst/>
+          </a:prstGeom>
+        </p:spPr>
+      </p:pic>
+    </p:spTree>
+    <p:extLst>
+      <p:ext uri="{BB962C8B-B14F-4D97-AF65-F5344CB8AC3E}">
+        <p14:creationId xmlns:p14="http://schemas.microsoft.com/office/powerpoint/2010/main" val="2529802713"/>
+      </p:ext>
+    </p:extLst>
+  </p:cSld>
+  <p:clrMapOvr>
+    <a:masterClrMapping/>
+  </p:clrMapOvr>
+</p:sld>
+</file>
+
 <file path=ppt/slides/slide4.xml><?xml version="1.0" encoding="utf-8"?>
 <p:sld xmlns:a="http://schemas.openxmlformats.org/drawingml/2006/main" xmlns:r="http://schemas.openxmlformats.org/officeDocument/2006/relationships" xmlns:p="http://schemas.openxmlformats.org/presentationml/2006/main">
   <p:cSld>
@@ -13448,7 +13763,7 @@
           <a:graphicData uri="http://schemas.openxmlformats.org/presentationml/2006/ole">
             <mc:AlternateContent xmlns:mc="http://schemas.openxmlformats.org/markup-compatibility/2006">
               <mc:Choice xmlns:v="urn:schemas-microsoft-com:vml" Requires="v">
-                <p:oleObj spid="_x0000_s1242" name="Worksheet" r:id="rId4" imgW="4733810" imgH="3971970" progId="Excel.Sheet.8">
+                <p:oleObj spid="_x0000_s1297" name="Worksheet" r:id="rId4" imgW="4733810" imgH="3971970" progId="Excel.Sheet.8">
                   <p:embed/>
                 </p:oleObj>
               </mc:Choice>
@@ -13532,7 +13847,7 @@
         <p:spPr bwMode="auto">
           <a:xfrm>
             <a:off x="990600" y="1746905"/>
-            <a:ext cx="2540054" cy="523220"/>
+            <a:ext cx="2736647" cy="523220"/>
           </a:xfrm>
           <a:prstGeom prst="rect">
             <a:avLst/>
@@ -13587,8 +13902,33 @@
                 <a:latin typeface="Times New Roman" charset="0"/>
                 <a:ea typeface="ＭＳ Ｐゴシック" charset="0"/>
               </a:rPr>
-              <a:t>Two-sample test</a:t>
-            </a:r>
+              <a:t>Two-sample </a:t>
+            </a:r>
+            <a:r>
+              <a:rPr lang="en-US" sz="2800" dirty="0" smtClean="0">
+                <a:latin typeface="Times New Roman" charset="0"/>
+                <a:ea typeface="ＭＳ Ｐゴシック" charset="0"/>
+              </a:rPr>
+              <a:t>t</a:t>
+            </a:r>
+            <a:r>
+              <a:rPr lang="en-US" sz="2800" dirty="0" smtClean="0">
+                <a:latin typeface="Times New Roman" charset="0"/>
+                <a:ea typeface="ＭＳ Ｐゴシック" charset="0"/>
+              </a:rPr>
+              <a:t> </a:t>
+            </a:r>
+            <a:r>
+              <a:rPr lang="en-US" sz="2800" dirty="0" smtClean="0">
+                <a:latin typeface="Times New Roman" charset="0"/>
+                <a:ea typeface="ＭＳ Ｐゴシック" charset="0"/>
+              </a:rPr>
+              <a:t>test</a:t>
+            </a:r>
+            <a:endParaRPr lang="en-US" sz="2800" dirty="0">
+              <a:latin typeface="Times New Roman" charset="0"/>
+              <a:ea typeface="ＭＳ Ｐゴシック" charset="0"/>
+            </a:endParaRPr>
           </a:p>
         </p:txBody>
       </p:sp>
@@ -13685,7 +14025,7 @@
           <a:graphicData uri="http://schemas.openxmlformats.org/presentationml/2006/ole">
             <mc:AlternateContent xmlns:mc="http://schemas.openxmlformats.org/markup-compatibility/2006">
               <mc:Choice xmlns:v="urn:schemas-microsoft-com:vml" Requires="v">
-                <p:oleObj spid="_x0000_s1243" name="Worksheet" r:id="rId6" imgW="4752989" imgH="3981420" progId="Excel.Sheet.8">
+                <p:oleObj spid="_x0000_s1298" name="Worksheet" r:id="rId6" imgW="4752989" imgH="3981420" progId="Excel.Sheet.8">
                   <p:embed/>
                 </p:oleObj>
               </mc:Choice>
@@ -14026,10 +14366,16 @@
           </a:p>
           <a:p>
             <a:r>
+              <a:rPr lang="en-US" i="1" dirty="0">
+                <a:latin typeface="Palatino Linotype" pitchFamily="18" charset="0"/>
+              </a:rPr>
+              <a:t>F</a:t>
+            </a:r>
+            <a:r>
               <a:rPr lang="en-US" dirty="0">
                 <a:latin typeface="Palatino Linotype" pitchFamily="18" charset="0"/>
               </a:rPr>
-              <a:t>F-ratio </a:t>
+              <a:t>-ratio </a:t>
             </a:r>
             <a:r>
               <a:rPr lang="en-US" sz="2000" dirty="0">
@@ -14095,6 +14441,118 @@
 </file>
 
 <file path=ppt/slides/slide6.xml><?xml version="1.0" encoding="utf-8"?>
+<p:sld xmlns:a="http://schemas.openxmlformats.org/drawingml/2006/main" xmlns:r="http://schemas.openxmlformats.org/officeDocument/2006/relationships" xmlns:p="http://schemas.openxmlformats.org/presentationml/2006/main">
+  <p:cSld>
+    <p:spTree>
+      <p:nvGrpSpPr>
+        <p:cNvPr id="1" name=""/>
+        <p:cNvGrpSpPr/>
+        <p:nvPr/>
+      </p:nvGrpSpPr>
+      <p:grpSpPr>
+        <a:xfrm>
+          <a:off x="0" y="0"/>
+          <a:ext cx="0" cy="0"/>
+          <a:chOff x="0" y="0"/>
+          <a:chExt cx="0" cy="0"/>
+        </a:xfrm>
+      </p:grpSpPr>
+      <p:sp>
+        <p:nvSpPr>
+          <p:cNvPr id="2" name="Title 1"/>
+          <p:cNvSpPr>
+            <a:spLocks noGrp="1"/>
+          </p:cNvSpPr>
+          <p:nvPr>
+            <p:ph type="title"/>
+          </p:nvPr>
+        </p:nvSpPr>
+        <p:spPr/>
+        <p:txBody>
+          <a:bodyPr>
+            <a:normAutofit/>
+          </a:bodyPr>
+          <a:lstStyle/>
+          <a:p>
+            <a:r>
+              <a:rPr lang="en-US" sz="4000" b="1" dirty="0">
+                <a:solidFill>
+                  <a:srgbClr val="000099"/>
+                </a:solidFill>
+                <a:latin typeface="Palatino Linotype" pitchFamily="18" charset="0"/>
+              </a:rPr>
+              <a:t>Purpose of ANOVA</a:t>
+            </a:r>
+          </a:p>
+        </p:txBody>
+      </p:sp>
+      <p:sp>
+        <p:nvSpPr>
+          <p:cNvPr id="4" name="Slide Number Placeholder 3"/>
+          <p:cNvSpPr>
+            <a:spLocks noGrp="1"/>
+          </p:cNvSpPr>
+          <p:nvPr>
+            <p:ph type="sldNum" sz="quarter" idx="12"/>
+          </p:nvPr>
+        </p:nvSpPr>
+        <p:spPr/>
+        <p:txBody>
+          <a:bodyPr/>
+          <a:lstStyle/>
+          <a:p>
+            <a:fld id="{71E0F468-36C2-4A31-ABC4-3235B7B5704F}" type="slidenum">
+              <a:rPr lang="en-US" smtClean="0"/>
+              <a:t>6</a:t>
+            </a:fld>
+            <a:endParaRPr lang="en-US"/>
+          </a:p>
+        </p:txBody>
+      </p:sp>
+      <p:pic>
+        <p:nvPicPr>
+          <p:cNvPr id="6" name="Picture 5" descr="Screen Shot 2018-04-17 at 8.57.21 AM.png"/>
+          <p:cNvPicPr>
+            <a:picLocks noChangeAspect="1"/>
+          </p:cNvPicPr>
+          <p:nvPr/>
+        </p:nvPicPr>
+        <p:blipFill>
+          <a:blip r:embed="rId2">
+            <a:extLst>
+              <a:ext uri="{28A0092B-C50C-407E-A947-70E740481C1C}">
+                <a14:useLocalDpi xmlns:a14="http://schemas.microsoft.com/office/drawing/2010/main" val="0"/>
+              </a:ext>
+            </a:extLst>
+          </a:blip>
+          <a:stretch>
+            <a:fillRect/>
+          </a:stretch>
+        </p:blipFill>
+        <p:spPr>
+          <a:xfrm>
+            <a:off x="0" y="1524000"/>
+            <a:ext cx="9144000" cy="5001464"/>
+          </a:xfrm>
+          <a:prstGeom prst="rect">
+            <a:avLst/>
+          </a:prstGeom>
+        </p:spPr>
+      </p:pic>
+    </p:spTree>
+    <p:extLst>
+      <p:ext uri="{BB962C8B-B14F-4D97-AF65-F5344CB8AC3E}">
+        <p14:creationId xmlns:p14="http://schemas.microsoft.com/office/powerpoint/2010/main" val="2513938497"/>
+      </p:ext>
+    </p:extLst>
+  </p:cSld>
+  <p:clrMapOvr>
+    <a:masterClrMapping/>
+  </p:clrMapOvr>
+</p:sld>
+</file>
+
+<file path=ppt/slides/slide7.xml><?xml version="1.0" encoding="utf-8"?>
 <p:sld xmlns:a="http://schemas.openxmlformats.org/drawingml/2006/main" xmlns:r="http://schemas.openxmlformats.org/officeDocument/2006/relationships" xmlns:p="http://schemas.openxmlformats.org/presentationml/2006/main">
   <p:cSld>
     <p:spTree>
@@ -14305,7 +14763,7 @@
           <a:p>
             <a:fld id="{71E0F468-36C2-4A31-ABC4-3235B7B5704F}" type="slidenum">
               <a:rPr lang="en-US" smtClean="0"/>
-              <a:t>6</a:t>
+              <a:t>7</a:t>
             </a:fld>
             <a:endParaRPr lang="en-US"/>
           </a:p>
@@ -14324,7 +14782,7 @@
 </p:sld>
 </file>
 
-<file path=ppt/slides/slide7.xml><?xml version="1.0" encoding="utf-8"?>
+<file path=ppt/slides/slide8.xml><?xml version="1.0" encoding="utf-8"?>
 <p:sld xmlns:a="http://schemas.openxmlformats.org/drawingml/2006/main" xmlns:r="http://schemas.openxmlformats.org/officeDocument/2006/relationships" xmlns:p="http://schemas.openxmlformats.org/presentationml/2006/main">
   <p:cSld>
     <p:spTree>
@@ -14544,7 +15002,7 @@
           <a:p>
             <a:fld id="{9BF08E50-6CC6-4A91-911D-ECC366F28EE7}" type="slidenum">
               <a:rPr lang="en-US" smtClean="0"/>
-              <a:t>7</a:t>
+              <a:t>8</a:t>
             </a:fld>
             <a:endParaRPr lang="en-US"/>
           </a:p>
@@ -14554,168 +15012,6 @@
     <p:extLst>
       <p:ext uri="{BB962C8B-B14F-4D97-AF65-F5344CB8AC3E}">
         <p14:creationId xmlns:p14="http://schemas.microsoft.com/office/powerpoint/2010/main" val="3965805989"/>
-      </p:ext>
-    </p:extLst>
-  </p:cSld>
-  <p:clrMapOvr>
-    <a:masterClrMapping/>
-  </p:clrMapOvr>
-</p:sld>
-</file>
-
-<file path=ppt/slides/slide8.xml><?xml version="1.0" encoding="utf-8"?>
-<p:sld xmlns:a="http://schemas.openxmlformats.org/drawingml/2006/main" xmlns:r="http://schemas.openxmlformats.org/officeDocument/2006/relationships" xmlns:p="http://schemas.openxmlformats.org/presentationml/2006/main">
-  <p:cSld>
-    <p:spTree>
-      <p:nvGrpSpPr>
-        <p:cNvPr id="1" name=""/>
-        <p:cNvGrpSpPr/>
-        <p:nvPr/>
-      </p:nvGrpSpPr>
-      <p:grpSpPr>
-        <a:xfrm>
-          <a:off x="0" y="0"/>
-          <a:ext cx="0" cy="0"/>
-          <a:chOff x="0" y="0"/>
-          <a:chExt cx="0" cy="0"/>
-        </a:xfrm>
-      </p:grpSpPr>
-      <p:sp>
-        <p:nvSpPr>
-          <p:cNvPr id="2" name="Title 1"/>
-          <p:cNvSpPr>
-            <a:spLocks noGrp="1"/>
-          </p:cNvSpPr>
-          <p:nvPr>
-            <p:ph type="title"/>
-          </p:nvPr>
-        </p:nvSpPr>
-        <p:spPr/>
-        <p:txBody>
-          <a:bodyPr>
-            <a:noAutofit/>
-          </a:bodyPr>
-          <a:lstStyle/>
-          <a:p>
-            <a:r>
-              <a:rPr lang="en-US" sz="3600" b="1" dirty="0">
-                <a:solidFill>
-                  <a:srgbClr val="000099"/>
-                </a:solidFill>
-                <a:latin typeface="Palatino Linotype" pitchFamily="18" charset="0"/>
-              </a:rPr>
-              <a:t>From different means to different types of variation</a:t>
-            </a:r>
-          </a:p>
-        </p:txBody>
-      </p:sp>
-      <p:sp>
-        <p:nvSpPr>
-          <p:cNvPr id="3" name="Content Placeholder 2"/>
-          <p:cNvSpPr>
-            <a:spLocks noGrp="1"/>
-          </p:cNvSpPr>
-          <p:nvPr>
-            <p:ph idx="1"/>
-          </p:nvPr>
-        </p:nvSpPr>
-        <p:spPr/>
-        <p:txBody>
-          <a:bodyPr>
-            <a:normAutofit lnSpcReduction="10000"/>
-          </a:bodyPr>
-          <a:lstStyle/>
-          <a:p>
-            <a:r>
-              <a:rPr lang="en-US" dirty="0">
-                <a:latin typeface="Palatino Linotype" pitchFamily="18" charset="0"/>
-              </a:rPr>
-              <a:t>Variation: the extent to which various scores in a distribution deviate from the mean of the distribution</a:t>
-            </a:r>
-          </a:p>
-          <a:p>
-            <a:pPr lvl="1"/>
-            <a:r>
-              <a:rPr lang="en-US" dirty="0">
-                <a:solidFill>
-                  <a:srgbClr val="FF0000"/>
-                </a:solidFill>
-                <a:latin typeface="Palatino Linotype" pitchFamily="18" charset="0"/>
-              </a:rPr>
-              <a:t>Within-groups variation</a:t>
-            </a:r>
-            <a:r>
-              <a:rPr lang="en-US" dirty="0">
-                <a:latin typeface="Palatino Linotype" pitchFamily="18" charset="0"/>
-              </a:rPr>
-              <a:t>: deviation of individual sample scores from the mean of the sample</a:t>
-            </a:r>
-          </a:p>
-          <a:p>
-            <a:pPr lvl="1"/>
-            <a:r>
-              <a:rPr lang="en-US" dirty="0">
-                <a:solidFill>
-                  <a:srgbClr val="FF0000"/>
-                </a:solidFill>
-                <a:latin typeface="Palatino Linotype" pitchFamily="18" charset="0"/>
-              </a:rPr>
-              <a:t>Between-groups variation</a:t>
-            </a:r>
-            <a:r>
-              <a:rPr lang="en-US" dirty="0">
-                <a:latin typeface="Palatino Linotype" pitchFamily="18" charset="0"/>
-              </a:rPr>
-              <a:t>: deviations of sample means from the grand mean</a:t>
-            </a:r>
-          </a:p>
-          <a:p>
-            <a:pPr lvl="1"/>
-            <a:r>
-              <a:rPr lang="en-US" dirty="0">
-                <a:solidFill>
-                  <a:srgbClr val="FF0000"/>
-                </a:solidFill>
-                <a:latin typeface="Palatino Linotype" pitchFamily="18" charset="0"/>
-              </a:rPr>
-              <a:t>Total variation</a:t>
-            </a:r>
-            <a:r>
-              <a:rPr lang="en-US" dirty="0">
-                <a:latin typeface="Palatino Linotype" pitchFamily="18" charset="0"/>
-              </a:rPr>
-              <a:t>: deviation of individual sample scores from the grand mean</a:t>
-            </a:r>
-          </a:p>
-        </p:txBody>
-      </p:sp>
-      <p:sp>
-        <p:nvSpPr>
-          <p:cNvPr id="4" name="Slide Number Placeholder 3"/>
-          <p:cNvSpPr>
-            <a:spLocks noGrp="1"/>
-          </p:cNvSpPr>
-          <p:nvPr>
-            <p:ph type="sldNum" sz="quarter" idx="12"/>
-          </p:nvPr>
-        </p:nvSpPr>
-        <p:spPr/>
-        <p:txBody>
-          <a:bodyPr/>
-          <a:lstStyle/>
-          <a:p>
-            <a:fld id="{71E0F468-36C2-4A31-ABC4-3235B7B5704F}" type="slidenum">
-              <a:rPr lang="en-US" smtClean="0"/>
-              <a:t>8</a:t>
-            </a:fld>
-            <a:endParaRPr lang="en-US"/>
-          </a:p>
-        </p:txBody>
-      </p:sp>
-    </p:spTree>
-    <p:extLst>
-      <p:ext uri="{BB962C8B-B14F-4D97-AF65-F5344CB8AC3E}">
-        <p14:creationId xmlns:p14="http://schemas.microsoft.com/office/powerpoint/2010/main" val="3451156998"/>
       </p:ext>
     </p:extLst>
   </p:cSld>
@@ -14755,18 +15051,18 @@
         <p:spPr/>
         <p:txBody>
           <a:bodyPr>
-            <a:normAutofit/>
+            <a:noAutofit/>
           </a:bodyPr>
           <a:lstStyle/>
           <a:p>
             <a:r>
-              <a:rPr lang="en-US" sz="4800" b="1" dirty="0">
+              <a:rPr lang="en-US" sz="3600" b="1" dirty="0">
                 <a:solidFill>
                   <a:srgbClr val="000099"/>
                 </a:solidFill>
                 <a:latin typeface="Palatino Linotype" pitchFamily="18" charset="0"/>
               </a:rPr>
-              <a:t>Example</a:t>
+              <a:t>From different means to different types of variation</a:t>
             </a:r>
           </a:p>
         </p:txBody>
@@ -14784,7 +15080,7 @@
         <p:spPr/>
         <p:txBody>
           <a:bodyPr>
-            <a:normAutofit fontScale="77500" lnSpcReduction="20000"/>
+            <a:normAutofit lnSpcReduction="10000"/>
           </a:bodyPr>
           <a:lstStyle/>
           <a:p>
@@ -14792,45 +15088,61 @@
               <a:rPr lang="en-US" dirty="0">
                 <a:latin typeface="Palatino Linotype" pitchFamily="18" charset="0"/>
               </a:rPr>
-              <a:t>Suppose we are interested in treatment that purport to reduce agoraphobia (fear of unfamiliar environments) symptoms. Treatments are expensive and we also have little money for screening, so we are only able to find 12 sufferers and randomly assign them to 3 conditions:</a:t>
+              <a:t>Variation: the extent to which various scores in a distribution deviate from the mean of the distribution</a:t>
             </a:r>
           </a:p>
           <a:p>
             <a:pPr lvl="1"/>
             <a:r>
               <a:rPr lang="en-US" dirty="0">
-                <a:latin typeface="Palatino Linotype" pitchFamily="18" charset="0"/>
-              </a:rPr>
-              <a:t>Rational-Emotive (REBT)</a:t>
+                <a:solidFill>
+                  <a:srgbClr val="FF0000"/>
+                </a:solidFill>
+                <a:latin typeface="Palatino Linotype" pitchFamily="18" charset="0"/>
+              </a:rPr>
+              <a:t>Within-groups variation</a:t>
+            </a:r>
+            <a:r>
+              <a:rPr lang="en-US" dirty="0">
+                <a:latin typeface="Palatino Linotype" pitchFamily="18" charset="0"/>
+              </a:rPr>
+              <a:t>: deviation of individual sample scores from the mean of the sample</a:t>
             </a:r>
           </a:p>
           <a:p>
             <a:pPr lvl="1"/>
             <a:r>
               <a:rPr lang="en-US" dirty="0">
-                <a:latin typeface="Palatino Linotype" pitchFamily="18" charset="0"/>
-              </a:rPr>
-              <a:t>Psychoanalytic (PA)</a:t>
+                <a:solidFill>
+                  <a:srgbClr val="FF0000"/>
+                </a:solidFill>
+                <a:latin typeface="Palatino Linotype" pitchFamily="18" charset="0"/>
+              </a:rPr>
+              <a:t>Between-groups variation</a:t>
+            </a:r>
+            <a:r>
+              <a:rPr lang="en-US" dirty="0">
+                <a:latin typeface="Palatino Linotype" pitchFamily="18" charset="0"/>
+              </a:rPr>
+              <a:t>: deviations of sample means from the grand mean</a:t>
             </a:r>
           </a:p>
           <a:p>
             <a:pPr lvl="1"/>
             <a:r>
               <a:rPr lang="en-US" dirty="0">
-                <a:latin typeface="Palatino Linotype" pitchFamily="18" charset="0"/>
-              </a:rPr>
-              <a:t>Behavioral (B)</a:t>
-            </a:r>
-          </a:p>
-          <a:p>
-            <a:pPr marL="457200" lvl="1" indent="0">
-              <a:buNone/>
-            </a:pPr>
+                <a:solidFill>
+                  <a:srgbClr val="FF0000"/>
+                </a:solidFill>
+                <a:latin typeface="Palatino Linotype" pitchFamily="18" charset="0"/>
+              </a:rPr>
+              <a:t>Total variation</a:t>
+            </a:r>
             <a:r>
               <a:rPr lang="en-US" dirty="0">
                 <a:latin typeface="Palatino Linotype" pitchFamily="18" charset="0"/>
               </a:rPr>
-              <a:t>After 12 weeks of therapy, we administer the Panic scale (higher values mean more anxiety), and we determine the total score on a random subset of questions. How can we determine whether there is difference among the treatment?</a:t>
+              <a:t>: deviation of individual sample scores from the grand mean</a:t>
             </a:r>
           </a:p>
         </p:txBody>
@@ -14850,22 +15162,18 @@
           <a:bodyPr/>
           <a:lstStyle/>
           <a:p>
-            <a:fld id="{9BF08E50-6CC6-4A91-911D-ECC366F28EE7}" type="slidenum">
-              <a:rPr lang="en-US" smtClean="0">
-                <a:latin typeface="Palatino Linotype" pitchFamily="18" charset="0"/>
-              </a:rPr>
+            <a:fld id="{71E0F468-36C2-4A31-ABC4-3235B7B5704F}" type="slidenum">
+              <a:rPr lang="en-US" smtClean="0"/>
               <a:t>9</a:t>
             </a:fld>
-            <a:endParaRPr lang="en-US">
-              <a:latin typeface="Palatino Linotype" pitchFamily="18" charset="0"/>
-            </a:endParaRPr>
+            <a:endParaRPr lang="en-US"/>
           </a:p>
         </p:txBody>
       </p:sp>
     </p:spTree>
     <p:extLst>
       <p:ext uri="{BB962C8B-B14F-4D97-AF65-F5344CB8AC3E}">
-        <p14:creationId xmlns:p14="http://schemas.microsoft.com/office/powerpoint/2010/main" val="2197502359"/>
+        <p14:creationId xmlns:p14="http://schemas.microsoft.com/office/powerpoint/2010/main" val="3451156998"/>
       </p:ext>
     </p:extLst>
   </p:cSld>

</xml_diff>